<commit_message>
avancée sur le mémoire
</commit_message>
<xml_diff>
--- a/Image/hardware.pptx
+++ b/Image/hardware.pptx
@@ -6,6 +6,7 @@
   </p:sldMasterIdLst>
   <p:sldIdLst>
     <p:sldId id="256" r:id="rId2"/>
+    <p:sldId id="257" r:id="rId3"/>
   </p:sldIdLst>
   <p:sldSz cx="12192000" cy="6858000"/>
   <p:notesSz cx="6858000" cy="9144000"/>
@@ -104,6 +105,11 @@
       </a:defRPr>
     </a:lvl9pPr>
   </p:defaultTextStyle>
+  <p:extLst>
+    <p:ext uri="{EFAFB233-063F-42B5-8137-9DF3F51BA10A}">
+      <p15:sldGuideLst xmlns:p15="http://schemas.microsoft.com/office/powerpoint/2012/main"/>
+    </p:ext>
+  </p:extLst>
 </p:presentation>
 </file>
 
@@ -256,7 +262,7 @@
           <a:p>
             <a:fld id="{2A37D312-EED4-4869-A6A4-D5ECC4C74322}" type="datetimeFigureOut">
               <a:rPr lang="fr-BE" smtClean="0"/>
-              <a:t>09-08-20</a:t>
+              <a:t>11-08-20</a:t>
             </a:fld>
             <a:endParaRPr lang="fr-BE"/>
           </a:p>
@@ -456,7 +462,7 @@
           <a:p>
             <a:fld id="{2A37D312-EED4-4869-A6A4-D5ECC4C74322}" type="datetimeFigureOut">
               <a:rPr lang="fr-BE" smtClean="0"/>
-              <a:t>09-08-20</a:t>
+              <a:t>11-08-20</a:t>
             </a:fld>
             <a:endParaRPr lang="fr-BE"/>
           </a:p>
@@ -666,7 +672,7 @@
           <a:p>
             <a:fld id="{2A37D312-EED4-4869-A6A4-D5ECC4C74322}" type="datetimeFigureOut">
               <a:rPr lang="fr-BE" smtClean="0"/>
-              <a:t>09-08-20</a:t>
+              <a:t>11-08-20</a:t>
             </a:fld>
             <a:endParaRPr lang="fr-BE"/>
           </a:p>
@@ -866,7 +872,7 @@
           <a:p>
             <a:fld id="{2A37D312-EED4-4869-A6A4-D5ECC4C74322}" type="datetimeFigureOut">
               <a:rPr lang="fr-BE" smtClean="0"/>
-              <a:t>09-08-20</a:t>
+              <a:t>11-08-20</a:t>
             </a:fld>
             <a:endParaRPr lang="fr-BE"/>
           </a:p>
@@ -1142,7 +1148,7 @@
           <a:p>
             <a:fld id="{2A37D312-EED4-4869-A6A4-D5ECC4C74322}" type="datetimeFigureOut">
               <a:rPr lang="fr-BE" smtClean="0"/>
-              <a:t>09-08-20</a:t>
+              <a:t>11-08-20</a:t>
             </a:fld>
             <a:endParaRPr lang="fr-BE"/>
           </a:p>
@@ -1410,7 +1416,7 @@
           <a:p>
             <a:fld id="{2A37D312-EED4-4869-A6A4-D5ECC4C74322}" type="datetimeFigureOut">
               <a:rPr lang="fr-BE" smtClean="0"/>
-              <a:t>09-08-20</a:t>
+              <a:t>11-08-20</a:t>
             </a:fld>
             <a:endParaRPr lang="fr-BE"/>
           </a:p>
@@ -1825,7 +1831,7 @@
           <a:p>
             <a:fld id="{2A37D312-EED4-4869-A6A4-D5ECC4C74322}" type="datetimeFigureOut">
               <a:rPr lang="fr-BE" smtClean="0"/>
-              <a:t>09-08-20</a:t>
+              <a:t>11-08-20</a:t>
             </a:fld>
             <a:endParaRPr lang="fr-BE"/>
           </a:p>
@@ -1967,7 +1973,7 @@
           <a:p>
             <a:fld id="{2A37D312-EED4-4869-A6A4-D5ECC4C74322}" type="datetimeFigureOut">
               <a:rPr lang="fr-BE" smtClean="0"/>
-              <a:t>09-08-20</a:t>
+              <a:t>11-08-20</a:t>
             </a:fld>
             <a:endParaRPr lang="fr-BE"/>
           </a:p>
@@ -2080,7 +2086,7 @@
           <a:p>
             <a:fld id="{2A37D312-EED4-4869-A6A4-D5ECC4C74322}" type="datetimeFigureOut">
               <a:rPr lang="fr-BE" smtClean="0"/>
-              <a:t>09-08-20</a:t>
+              <a:t>11-08-20</a:t>
             </a:fld>
             <a:endParaRPr lang="fr-BE"/>
           </a:p>
@@ -2393,7 +2399,7 @@
           <a:p>
             <a:fld id="{2A37D312-EED4-4869-A6A4-D5ECC4C74322}" type="datetimeFigureOut">
               <a:rPr lang="fr-BE" smtClean="0"/>
-              <a:t>09-08-20</a:t>
+              <a:t>11-08-20</a:t>
             </a:fld>
             <a:endParaRPr lang="fr-BE"/>
           </a:p>
@@ -2682,7 +2688,7 @@
           <a:p>
             <a:fld id="{2A37D312-EED4-4869-A6A4-D5ECC4C74322}" type="datetimeFigureOut">
               <a:rPr lang="fr-BE" smtClean="0"/>
-              <a:t>09-08-20</a:t>
+              <a:t>11-08-20</a:t>
             </a:fld>
             <a:endParaRPr lang="fr-BE"/>
           </a:p>
@@ -2925,7 +2931,7 @@
           <a:p>
             <a:fld id="{2A37D312-EED4-4869-A6A4-D5ECC4C74322}" type="datetimeFigureOut">
               <a:rPr lang="fr-BE" smtClean="0"/>
-              <a:t>09-08-20</a:t>
+              <a:t>11-08-20</a:t>
             </a:fld>
             <a:endParaRPr lang="fr-BE"/>
           </a:p>
@@ -3342,10 +3348,3657 @@
           <a:chExt cx="0" cy="0"/>
         </a:xfrm>
       </p:grpSpPr>
+      <p:cxnSp>
+        <p:nvCxnSpPr>
+          <p:cNvPr id="47" name="Connecteur : en angle 46">
+            <a:extLst>
+              <a:ext uri="{FF2B5EF4-FFF2-40B4-BE49-F238E27FC236}">
+                <a16:creationId xmlns:a16="http://schemas.microsoft.com/office/drawing/2014/main" id="{547C6794-8263-4A01-A6F2-FE047631DDC4}"/>
+              </a:ext>
+            </a:extLst>
+          </p:cNvPr>
+          <p:cNvCxnSpPr>
+            <a:cxnSpLocks/>
+            <a:stCxn id="8" idx="2"/>
+          </p:cNvCxnSpPr>
+          <p:nvPr/>
+        </p:nvCxnSpPr>
+        <p:spPr>
+          <a:xfrm rot="16200000" flipH="1">
+            <a:off x="4821025" y="3539564"/>
+            <a:ext cx="1248668" cy="525959"/>
+          </a:xfrm>
+          <a:prstGeom prst="bentConnector3">
+            <a:avLst>
+              <a:gd name="adj1" fmla="val 21891"/>
+            </a:avLst>
+          </a:prstGeom>
+          <a:ln>
+            <a:tailEnd type="triangle"/>
+          </a:ln>
+        </p:spPr>
+        <p:style>
+          <a:lnRef idx="1">
+            <a:schemeClr val="accent6"/>
+          </a:lnRef>
+          <a:fillRef idx="0">
+            <a:schemeClr val="accent6"/>
+          </a:fillRef>
+          <a:effectRef idx="0">
+            <a:schemeClr val="accent6"/>
+          </a:effectRef>
+          <a:fontRef idx="minor">
+            <a:schemeClr val="tx1"/>
+          </a:fontRef>
+        </p:style>
+      </p:cxnSp>
+      <p:cxnSp>
+        <p:nvCxnSpPr>
+          <p:cNvPr id="43" name="Connecteur : en angle 42">
+            <a:extLst>
+              <a:ext uri="{FF2B5EF4-FFF2-40B4-BE49-F238E27FC236}">
+                <a16:creationId xmlns:a16="http://schemas.microsoft.com/office/drawing/2014/main" id="{123B4460-8D3F-4C47-B1C7-D75D3705A61B}"/>
+              </a:ext>
+            </a:extLst>
+          </p:cNvPr>
+          <p:cNvCxnSpPr>
+            <a:cxnSpLocks/>
+            <a:stCxn id="6" idx="2"/>
+          </p:cNvCxnSpPr>
+          <p:nvPr/>
+        </p:nvCxnSpPr>
+        <p:spPr>
+          <a:xfrm rot="16200000" flipH="1">
+            <a:off x="4210585" y="3539115"/>
+            <a:ext cx="1248670" cy="526859"/>
+          </a:xfrm>
+          <a:prstGeom prst="bentConnector3">
+            <a:avLst>
+              <a:gd name="adj1" fmla="val 20412"/>
+            </a:avLst>
+          </a:prstGeom>
+          <a:ln>
+            <a:tailEnd type="triangle"/>
+          </a:ln>
+        </p:spPr>
+        <p:style>
+          <a:lnRef idx="1">
+            <a:schemeClr val="accent2"/>
+          </a:lnRef>
+          <a:fillRef idx="0">
+            <a:schemeClr val="accent2"/>
+          </a:fillRef>
+          <a:effectRef idx="0">
+            <a:schemeClr val="accent2"/>
+          </a:effectRef>
+          <a:fontRef idx="minor">
+            <a:schemeClr val="tx1"/>
+          </a:fontRef>
+        </p:style>
+      </p:cxnSp>
+      <p:cxnSp>
+        <p:nvCxnSpPr>
+          <p:cNvPr id="36" name="Connecteur : en angle 35">
+            <a:extLst>
+              <a:ext uri="{FF2B5EF4-FFF2-40B4-BE49-F238E27FC236}">
+                <a16:creationId xmlns:a16="http://schemas.microsoft.com/office/drawing/2014/main" id="{49C9916D-8BF7-4D84-9BBC-6BDFC610FA4F}"/>
+              </a:ext>
+            </a:extLst>
+          </p:cNvPr>
+          <p:cNvCxnSpPr>
+            <a:cxnSpLocks/>
+          </p:cNvCxnSpPr>
+          <p:nvPr/>
+        </p:nvCxnSpPr>
+        <p:spPr>
+          <a:xfrm rot="16200000" flipH="1">
+            <a:off x="3690253" y="3449460"/>
+            <a:ext cx="1248669" cy="706169"/>
+          </a:xfrm>
+          <a:prstGeom prst="bentConnector3">
+            <a:avLst>
+              <a:gd name="adj1" fmla="val 20412"/>
+            </a:avLst>
+          </a:prstGeom>
+          <a:ln>
+            <a:tailEnd type="triangle"/>
+          </a:ln>
+        </p:spPr>
+        <p:style>
+          <a:lnRef idx="1">
+            <a:schemeClr val="accent1"/>
+          </a:lnRef>
+          <a:fillRef idx="0">
+            <a:schemeClr val="accent1"/>
+          </a:fillRef>
+          <a:effectRef idx="0">
+            <a:schemeClr val="accent1"/>
+          </a:effectRef>
+          <a:fontRef idx="minor">
+            <a:schemeClr val="tx1"/>
+          </a:fontRef>
+        </p:style>
+      </p:cxnSp>
+      <p:cxnSp>
+        <p:nvCxnSpPr>
+          <p:cNvPr id="34" name="Connecteur : en angle 33">
+            <a:extLst>
+              <a:ext uri="{FF2B5EF4-FFF2-40B4-BE49-F238E27FC236}">
+                <a16:creationId xmlns:a16="http://schemas.microsoft.com/office/drawing/2014/main" id="{31566072-0945-41C7-855E-1EC8327AE0B8}"/>
+              </a:ext>
+            </a:extLst>
+          </p:cNvPr>
+          <p:cNvCxnSpPr>
+            <a:cxnSpLocks/>
+          </p:cNvCxnSpPr>
+          <p:nvPr/>
+        </p:nvCxnSpPr>
+        <p:spPr>
+          <a:xfrm rot="16200000" flipH="1">
+            <a:off x="3184673" y="3345053"/>
+            <a:ext cx="1248667" cy="914982"/>
+          </a:xfrm>
+          <a:prstGeom prst="bentConnector3">
+            <a:avLst>
+              <a:gd name="adj1" fmla="val 20412"/>
+            </a:avLst>
+          </a:prstGeom>
+          <a:ln>
+            <a:tailEnd type="triangle"/>
+          </a:ln>
+        </p:spPr>
+        <p:style>
+          <a:lnRef idx="1">
+            <a:schemeClr val="dk1"/>
+          </a:lnRef>
+          <a:fillRef idx="0">
+            <a:schemeClr val="dk1"/>
+          </a:fillRef>
+          <a:effectRef idx="0">
+            <a:schemeClr val="dk1"/>
+          </a:effectRef>
+          <a:fontRef idx="minor">
+            <a:schemeClr val="tx1"/>
+          </a:fontRef>
+        </p:style>
+      </p:cxnSp>
+      <mc:AlternateContent xmlns:mc="http://schemas.openxmlformats.org/markup-compatibility/2006">
+        <mc:Choice xmlns:a14="http://schemas.microsoft.com/office/drawing/2010/main" Requires="a14">
+          <p:sp>
+            <p:nvSpPr>
+              <p:cNvPr id="2" name="Rectangle 1">
+                <a:extLst>
+                  <a:ext uri="{FF2B5EF4-FFF2-40B4-BE49-F238E27FC236}">
+                    <a16:creationId xmlns:a16="http://schemas.microsoft.com/office/drawing/2014/main" id="{71C276B2-ED52-42E5-A0F3-D477AAFE674D}"/>
+                  </a:ext>
+                </a:extLst>
+              </p:cNvPr>
+              <p:cNvSpPr/>
+              <p:nvPr/>
+            </p:nvSpPr>
+            <p:spPr>
+              <a:xfrm>
+                <a:off x="3656509" y="2568223"/>
+                <a:ext cx="609988" cy="609988"/>
+              </a:xfrm>
+              <a:prstGeom prst="rect">
+                <a:avLst/>
+              </a:prstGeom>
+              <a:noFill/>
+              <a:ln w="9525" cap="flat" cmpd="sng" algn="ctr">
+                <a:solidFill>
+                  <a:schemeClr val="dk1"/>
+                </a:solidFill>
+                <a:prstDash val="solid"/>
+                <a:round/>
+                <a:headEnd type="none" w="med" len="med"/>
+                <a:tailEnd type="none" w="med" len="med"/>
+              </a:ln>
+            </p:spPr>
+            <p:style>
+              <a:lnRef idx="0">
+                <a:scrgbClr r="0" g="0" b="0"/>
+              </a:lnRef>
+              <a:fillRef idx="0">
+                <a:scrgbClr r="0" g="0" b="0"/>
+              </a:fillRef>
+              <a:effectRef idx="0">
+                <a:scrgbClr r="0" g="0" b="0"/>
+              </a:effectRef>
+              <a:fontRef idx="minor">
+                <a:schemeClr val="dk1"/>
+              </a:fontRef>
+            </p:style>
+            <p:txBody>
+              <a:bodyPr rtlCol="0" anchor="ctr"/>
+              <a:lstStyle/>
+              <a:p>
+                <a:pPr algn="ctr"/>
+                <a14:m>
+                  <m:oMathPara xmlns:m="http://schemas.openxmlformats.org/officeDocument/2006/math">
+                    <m:oMathParaPr>
+                      <m:jc m:val="centerGroup"/>
+                    </m:oMathParaPr>
+                    <m:oMath xmlns:m="http://schemas.openxmlformats.org/officeDocument/2006/math">
+                      <m:r>
+                        <a:rPr lang="fr-BE" b="0" i="1" smtClean="0">
+                          <a:latin typeface="Cambria Math" panose="02040503050406030204" pitchFamily="18" charset="0"/>
+                        </a:rPr>
+                        <m:t>𝑝</m:t>
+                      </m:r>
+                      <m:sSub>
+                        <m:sSubPr>
+                          <m:ctrlPr>
+                            <a:rPr lang="fr-BE" b="0" i="1" smtClean="0">
+                              <a:latin typeface="Cambria Math" panose="02040503050406030204" pitchFamily="18" charset="0"/>
+                            </a:rPr>
+                          </m:ctrlPr>
+                        </m:sSubPr>
+                        <m:e>
+                          <m:r>
+                            <a:rPr lang="fr-BE" b="0" i="1" smtClean="0">
+                              <a:latin typeface="Cambria Math" panose="02040503050406030204" pitchFamily="18" charset="0"/>
+                            </a:rPr>
+                            <m:t>𝑥</m:t>
+                          </m:r>
+                        </m:e>
+                        <m:sub>
+                          <m:r>
+                            <a:rPr lang="fr-BE" b="0" i="1" smtClean="0">
+                              <a:latin typeface="Cambria Math" panose="02040503050406030204" pitchFamily="18" charset="0"/>
+                            </a:rPr>
+                            <m:t>𝑖</m:t>
+                          </m:r>
+                        </m:sub>
+                      </m:sSub>
+                    </m:oMath>
+                  </m:oMathPara>
+                </a14:m>
+                <a:endParaRPr lang="fr-FR" dirty="0"/>
+              </a:p>
+            </p:txBody>
+          </p:sp>
+        </mc:Choice>
+        <mc:Fallback>
+          <p:sp>
+            <p:nvSpPr>
+              <p:cNvPr id="2" name="Rectangle 1">
+                <a:extLst>
+                  <a:ext uri="{FF2B5EF4-FFF2-40B4-BE49-F238E27FC236}">
+                    <a16:creationId xmlns:a16="http://schemas.microsoft.com/office/drawing/2014/main" id="{71C276B2-ED52-42E5-A0F3-D477AAFE674D}"/>
+                  </a:ext>
+                </a:extLst>
+              </p:cNvPr>
+              <p:cNvSpPr>
+                <a:spLocks noRot="1" noChangeAspect="1" noMove="1" noResize="1" noEditPoints="1" noAdjustHandles="1" noChangeArrowheads="1" noChangeShapeType="1" noTextEdit="1"/>
+              </p:cNvSpPr>
+              <p:nvPr/>
+            </p:nvSpPr>
+            <p:spPr>
+              <a:xfrm>
+                <a:off x="3656509" y="2568223"/>
+                <a:ext cx="609988" cy="609988"/>
+              </a:xfrm>
+              <a:prstGeom prst="rect">
+                <a:avLst/>
+              </a:prstGeom>
+              <a:blipFill>
+                <a:blip r:embed="rId2"/>
+                <a:stretch>
+                  <a:fillRect/>
+                </a:stretch>
+              </a:blipFill>
+              <a:ln w="9525" cap="flat" cmpd="sng" algn="ctr">
+                <a:solidFill>
+                  <a:schemeClr val="dk1"/>
+                </a:solidFill>
+                <a:prstDash val="solid"/>
+                <a:round/>
+                <a:headEnd type="none" w="med" len="med"/>
+                <a:tailEnd type="none" w="med" len="med"/>
+              </a:ln>
+            </p:spPr>
+            <p:txBody>
+              <a:bodyPr/>
+              <a:lstStyle/>
+              <a:p>
+                <a:r>
+                  <a:rPr lang="fr-FR">
+                    <a:noFill/>
+                  </a:rPr>
+                  <a:t> </a:t>
+                </a:r>
+              </a:p>
+            </p:txBody>
+          </p:sp>
+        </mc:Fallback>
+      </mc:AlternateContent>
+      <mc:AlternateContent xmlns:mc="http://schemas.openxmlformats.org/markup-compatibility/2006">
+        <mc:Choice xmlns:a14="http://schemas.microsoft.com/office/drawing/2010/main" Requires="a14">
+          <p:sp>
+            <p:nvSpPr>
+              <p:cNvPr id="4" name="Rectangle 3">
+                <a:extLst>
+                  <a:ext uri="{FF2B5EF4-FFF2-40B4-BE49-F238E27FC236}">
+                    <a16:creationId xmlns:a16="http://schemas.microsoft.com/office/drawing/2014/main" id="{EAA137D6-F0F7-411A-8099-11B7E07F12EE}"/>
+                  </a:ext>
+                </a:extLst>
+              </p:cNvPr>
+              <p:cNvSpPr/>
+              <p:nvPr/>
+            </p:nvSpPr>
+            <p:spPr>
+              <a:xfrm>
+                <a:off x="3046521" y="2568223"/>
+                <a:ext cx="609988" cy="609988"/>
+              </a:xfrm>
+              <a:prstGeom prst="rect">
+                <a:avLst/>
+              </a:prstGeom>
+              <a:noFill/>
+              <a:ln w="9525" cap="flat" cmpd="sng" algn="ctr">
+                <a:solidFill>
+                  <a:schemeClr val="dk1"/>
+                </a:solidFill>
+                <a:prstDash val="solid"/>
+                <a:round/>
+                <a:headEnd type="none" w="med" len="med"/>
+                <a:tailEnd type="none" w="med" len="med"/>
+              </a:ln>
+            </p:spPr>
+            <p:style>
+              <a:lnRef idx="0">
+                <a:scrgbClr r="0" g="0" b="0"/>
+              </a:lnRef>
+              <a:fillRef idx="0">
+                <a:scrgbClr r="0" g="0" b="0"/>
+              </a:fillRef>
+              <a:effectRef idx="0">
+                <a:scrgbClr r="0" g="0" b="0"/>
+              </a:effectRef>
+              <a:fontRef idx="minor">
+                <a:schemeClr val="dk1"/>
+              </a:fontRef>
+            </p:style>
+            <p:txBody>
+              <a:bodyPr rtlCol="0" anchor="ctr"/>
+              <a:lstStyle/>
+              <a:p>
+                <a:pPr algn="ctr"/>
+                <a14:m>
+                  <m:oMathPara xmlns:m="http://schemas.openxmlformats.org/officeDocument/2006/math">
+                    <m:oMathParaPr>
+                      <m:jc m:val="centerGroup"/>
+                    </m:oMathParaPr>
+                    <m:oMath xmlns:m="http://schemas.openxmlformats.org/officeDocument/2006/math">
+                      <m:r>
+                        <a:rPr lang="fr-BE" sz="1700" b="0" i="1" smtClean="0">
+                          <a:latin typeface="Cambria Math" panose="02040503050406030204" pitchFamily="18" charset="0"/>
+                        </a:rPr>
+                        <m:t>𝑝</m:t>
+                      </m:r>
+                      <m:sSub>
+                        <m:sSubPr>
+                          <m:ctrlPr>
+                            <a:rPr lang="fr-BE" sz="1700" b="0" i="1" smtClean="0">
+                              <a:latin typeface="Cambria Math" panose="02040503050406030204" pitchFamily="18" charset="0"/>
+                            </a:rPr>
+                          </m:ctrlPr>
+                        </m:sSubPr>
+                        <m:e>
+                          <m:r>
+                            <a:rPr lang="fr-BE" sz="1700" b="0" i="1" smtClean="0">
+                              <a:latin typeface="Cambria Math" panose="02040503050406030204" pitchFamily="18" charset="0"/>
+                            </a:rPr>
+                            <m:t>𝑥</m:t>
+                          </m:r>
+                        </m:e>
+                        <m:sub>
+                          <m:r>
+                            <a:rPr lang="fr-BE" sz="1700" b="0" i="1" smtClean="0">
+                              <a:latin typeface="Cambria Math" panose="02040503050406030204" pitchFamily="18" charset="0"/>
+                            </a:rPr>
+                            <m:t>0</m:t>
+                          </m:r>
+                        </m:sub>
+                      </m:sSub>
+                    </m:oMath>
+                  </m:oMathPara>
+                </a14:m>
+                <a:endParaRPr lang="fr-FR" sz="1700" dirty="0"/>
+              </a:p>
+            </p:txBody>
+          </p:sp>
+        </mc:Choice>
+        <mc:Fallback>
+          <p:sp>
+            <p:nvSpPr>
+              <p:cNvPr id="4" name="Rectangle 3">
+                <a:extLst>
+                  <a:ext uri="{FF2B5EF4-FFF2-40B4-BE49-F238E27FC236}">
+                    <a16:creationId xmlns:a16="http://schemas.microsoft.com/office/drawing/2014/main" id="{EAA137D6-F0F7-411A-8099-11B7E07F12EE}"/>
+                  </a:ext>
+                </a:extLst>
+              </p:cNvPr>
+              <p:cNvSpPr>
+                <a:spLocks noRot="1" noChangeAspect="1" noMove="1" noResize="1" noEditPoints="1" noAdjustHandles="1" noChangeArrowheads="1" noChangeShapeType="1" noTextEdit="1"/>
+              </p:cNvSpPr>
+              <p:nvPr/>
+            </p:nvSpPr>
+            <p:spPr>
+              <a:xfrm>
+                <a:off x="3046521" y="2568223"/>
+                <a:ext cx="609988" cy="609988"/>
+              </a:xfrm>
+              <a:prstGeom prst="rect">
+                <a:avLst/>
+              </a:prstGeom>
+              <a:blipFill>
+                <a:blip r:embed="rId3"/>
+                <a:stretch>
+                  <a:fillRect/>
+                </a:stretch>
+              </a:blipFill>
+              <a:ln w="9525" cap="flat" cmpd="sng" algn="ctr">
+                <a:solidFill>
+                  <a:schemeClr val="dk1"/>
+                </a:solidFill>
+                <a:prstDash val="solid"/>
+                <a:round/>
+                <a:headEnd type="none" w="med" len="med"/>
+                <a:tailEnd type="none" w="med" len="med"/>
+              </a:ln>
+            </p:spPr>
+            <p:txBody>
+              <a:bodyPr/>
+              <a:lstStyle/>
+              <a:p>
+                <a:r>
+                  <a:rPr lang="fr-FR">
+                    <a:noFill/>
+                  </a:rPr>
+                  <a:t> </a:t>
+                </a:r>
+              </a:p>
+            </p:txBody>
+          </p:sp>
+        </mc:Fallback>
+      </mc:AlternateContent>
+      <mc:AlternateContent xmlns:mc="http://schemas.openxmlformats.org/markup-compatibility/2006">
+        <mc:Choice xmlns:a14="http://schemas.microsoft.com/office/drawing/2010/main" Requires="a14">
+          <p:sp>
+            <p:nvSpPr>
+              <p:cNvPr id="6" name="Rectangle 5">
+                <a:extLst>
+                  <a:ext uri="{FF2B5EF4-FFF2-40B4-BE49-F238E27FC236}">
+                    <a16:creationId xmlns:a16="http://schemas.microsoft.com/office/drawing/2014/main" id="{070FBA32-46B7-43EE-B7B1-27ACA2B95AF1}"/>
+                  </a:ext>
+                </a:extLst>
+              </p:cNvPr>
+              <p:cNvSpPr/>
+              <p:nvPr/>
+            </p:nvSpPr>
+            <p:spPr>
+              <a:xfrm>
+                <a:off x="4266497" y="2568222"/>
+                <a:ext cx="609988" cy="609988"/>
+              </a:xfrm>
+              <a:prstGeom prst="rect">
+                <a:avLst/>
+              </a:prstGeom>
+              <a:noFill/>
+              <a:ln w="9525" cap="flat" cmpd="sng" algn="ctr">
+                <a:solidFill>
+                  <a:schemeClr val="dk1"/>
+                </a:solidFill>
+                <a:prstDash val="solid"/>
+                <a:round/>
+                <a:headEnd type="none" w="med" len="med"/>
+                <a:tailEnd type="none" w="med" len="med"/>
+              </a:ln>
+            </p:spPr>
+            <p:style>
+              <a:lnRef idx="0">
+                <a:scrgbClr r="0" g="0" b="0"/>
+              </a:lnRef>
+              <a:fillRef idx="0">
+                <a:scrgbClr r="0" g="0" b="0"/>
+              </a:fillRef>
+              <a:effectRef idx="0">
+                <a:scrgbClr r="0" g="0" b="0"/>
+              </a:effectRef>
+              <a:fontRef idx="minor">
+                <a:schemeClr val="dk1"/>
+              </a:fontRef>
+            </p:style>
+            <p:txBody>
+              <a:bodyPr rtlCol="0" anchor="ctr"/>
+              <a:lstStyle/>
+              <a:p>
+                <a:pPr algn="ctr"/>
+                <a14:m>
+                  <m:oMathPara xmlns:m="http://schemas.openxmlformats.org/officeDocument/2006/math">
+                    <m:oMathParaPr>
+                      <m:jc m:val="centerGroup"/>
+                    </m:oMathParaPr>
+                    <m:oMath xmlns:m="http://schemas.openxmlformats.org/officeDocument/2006/math">
+                      <m:r>
+                        <a:rPr lang="fr-BE" sz="1600" b="0" i="1" smtClean="0">
+                          <a:latin typeface="Cambria Math" panose="02040503050406030204" pitchFamily="18" charset="0"/>
+                        </a:rPr>
+                        <m:t>𝑝</m:t>
+                      </m:r>
+                      <m:sSub>
+                        <m:sSubPr>
+                          <m:ctrlPr>
+                            <a:rPr lang="fr-BE" sz="1600" b="0" i="1" smtClean="0">
+                              <a:latin typeface="Cambria Math" panose="02040503050406030204" pitchFamily="18" charset="0"/>
+                            </a:rPr>
+                          </m:ctrlPr>
+                        </m:sSubPr>
+                        <m:e>
+                          <m:r>
+                            <a:rPr lang="fr-BE" sz="1600" b="0" i="1" smtClean="0">
+                              <a:latin typeface="Cambria Math" panose="02040503050406030204" pitchFamily="18" charset="0"/>
+                            </a:rPr>
+                            <m:t>𝑥</m:t>
+                          </m:r>
+                        </m:e>
+                        <m:sub>
+                          <m:r>
+                            <a:rPr lang="fr-BE" sz="1600" b="0" i="1" smtClean="0">
+                              <a:latin typeface="Cambria Math" panose="02040503050406030204" pitchFamily="18" charset="0"/>
+                            </a:rPr>
+                            <m:t>𝑖</m:t>
+                          </m:r>
+                          <m:r>
+                            <a:rPr lang="fr-BE" sz="1600" b="0" i="1" smtClean="0">
+                              <a:latin typeface="Cambria Math" panose="02040503050406030204" pitchFamily="18" charset="0"/>
+                            </a:rPr>
+                            <m:t>+1</m:t>
+                          </m:r>
+                        </m:sub>
+                      </m:sSub>
+                    </m:oMath>
+                  </m:oMathPara>
+                </a14:m>
+                <a:endParaRPr lang="fr-FR" sz="1600" dirty="0"/>
+              </a:p>
+            </p:txBody>
+          </p:sp>
+        </mc:Choice>
+        <mc:Fallback>
+          <p:sp>
+            <p:nvSpPr>
+              <p:cNvPr id="6" name="Rectangle 5">
+                <a:extLst>
+                  <a:ext uri="{FF2B5EF4-FFF2-40B4-BE49-F238E27FC236}">
+                    <a16:creationId xmlns:a16="http://schemas.microsoft.com/office/drawing/2014/main" id="{070FBA32-46B7-43EE-B7B1-27ACA2B95AF1}"/>
+                  </a:ext>
+                </a:extLst>
+              </p:cNvPr>
+              <p:cNvSpPr>
+                <a:spLocks noRot="1" noChangeAspect="1" noMove="1" noResize="1" noEditPoints="1" noAdjustHandles="1" noChangeArrowheads="1" noChangeShapeType="1" noTextEdit="1"/>
+              </p:cNvSpPr>
+              <p:nvPr/>
+            </p:nvSpPr>
+            <p:spPr>
+              <a:xfrm>
+                <a:off x="4266497" y="2568222"/>
+                <a:ext cx="609988" cy="609988"/>
+              </a:xfrm>
+              <a:prstGeom prst="rect">
+                <a:avLst/>
+              </a:prstGeom>
+              <a:blipFill>
+                <a:blip r:embed="rId4"/>
+                <a:stretch>
+                  <a:fillRect l="-3922"/>
+                </a:stretch>
+              </a:blipFill>
+              <a:ln w="9525" cap="flat" cmpd="sng" algn="ctr">
+                <a:solidFill>
+                  <a:schemeClr val="dk1"/>
+                </a:solidFill>
+                <a:prstDash val="solid"/>
+                <a:round/>
+                <a:headEnd type="none" w="med" len="med"/>
+                <a:tailEnd type="none" w="med" len="med"/>
+              </a:ln>
+            </p:spPr>
+            <p:txBody>
+              <a:bodyPr/>
+              <a:lstStyle/>
+              <a:p>
+                <a:r>
+                  <a:rPr lang="fr-FR">
+                    <a:noFill/>
+                  </a:rPr>
+                  <a:t> </a:t>
+                </a:r>
+              </a:p>
+            </p:txBody>
+          </p:sp>
+        </mc:Fallback>
+      </mc:AlternateContent>
+      <mc:AlternateContent xmlns:mc="http://schemas.openxmlformats.org/markup-compatibility/2006">
+        <mc:Choice xmlns:a14="http://schemas.microsoft.com/office/drawing/2010/main" Requires="a14">
+          <p:sp>
+            <p:nvSpPr>
+              <p:cNvPr id="8" name="Rectangle 7">
+                <a:extLst>
+                  <a:ext uri="{FF2B5EF4-FFF2-40B4-BE49-F238E27FC236}">
+                    <a16:creationId xmlns:a16="http://schemas.microsoft.com/office/drawing/2014/main" id="{B549C5C0-E7A0-4490-A797-0D92AE4DC140}"/>
+                  </a:ext>
+                </a:extLst>
+              </p:cNvPr>
+              <p:cNvSpPr/>
+              <p:nvPr/>
+            </p:nvSpPr>
+            <p:spPr>
+              <a:xfrm>
+                <a:off x="4877386" y="2568222"/>
+                <a:ext cx="609988" cy="609988"/>
+              </a:xfrm>
+              <a:prstGeom prst="rect">
+                <a:avLst/>
+              </a:prstGeom>
+              <a:noFill/>
+              <a:ln w="9525" cap="flat" cmpd="sng" algn="ctr">
+                <a:solidFill>
+                  <a:schemeClr val="dk1"/>
+                </a:solidFill>
+                <a:prstDash val="solid"/>
+                <a:round/>
+                <a:headEnd type="none" w="med" len="med"/>
+                <a:tailEnd type="none" w="med" len="med"/>
+              </a:ln>
+            </p:spPr>
+            <p:style>
+              <a:lnRef idx="0">
+                <a:scrgbClr r="0" g="0" b="0"/>
+              </a:lnRef>
+              <a:fillRef idx="0">
+                <a:scrgbClr r="0" g="0" b="0"/>
+              </a:fillRef>
+              <a:effectRef idx="0">
+                <a:scrgbClr r="0" g="0" b="0"/>
+              </a:effectRef>
+              <a:fontRef idx="minor">
+                <a:schemeClr val="dk1"/>
+              </a:fontRef>
+            </p:style>
+            <p:txBody>
+              <a:bodyPr rtlCol="0" anchor="ctr"/>
+              <a:lstStyle/>
+              <a:p>
+                <a:pPr algn="ctr"/>
+                <a14:m>
+                  <m:oMathPara xmlns:m="http://schemas.openxmlformats.org/officeDocument/2006/math">
+                    <m:oMathParaPr>
+                      <m:jc m:val="centerGroup"/>
+                    </m:oMathParaPr>
+                    <m:oMath xmlns:m="http://schemas.openxmlformats.org/officeDocument/2006/math">
+                      <m:r>
+                        <a:rPr lang="fr-BE" sz="1400" b="0" i="1" smtClean="0">
+                          <a:latin typeface="Cambria Math" panose="02040503050406030204" pitchFamily="18" charset="0"/>
+                        </a:rPr>
+                        <m:t>𝑝</m:t>
+                      </m:r>
+                      <m:sSub>
+                        <m:sSubPr>
+                          <m:ctrlPr>
+                            <a:rPr lang="fr-BE" sz="1400" b="0" i="1" smtClean="0">
+                              <a:latin typeface="Cambria Math" panose="02040503050406030204" pitchFamily="18" charset="0"/>
+                            </a:rPr>
+                          </m:ctrlPr>
+                        </m:sSubPr>
+                        <m:e>
+                          <m:r>
+                            <a:rPr lang="fr-BE" sz="1400" b="0" i="1" smtClean="0">
+                              <a:latin typeface="Cambria Math" panose="02040503050406030204" pitchFamily="18" charset="0"/>
+                            </a:rPr>
+                            <m:t>𝑥</m:t>
+                          </m:r>
+                        </m:e>
+                        <m:sub>
+                          <m:sSub>
+                            <m:sSubPr>
+                              <m:ctrlPr>
+                                <a:rPr lang="fr-BE" sz="1400" b="0" i="1" smtClean="0">
+                                  <a:latin typeface="Cambria Math" panose="02040503050406030204" pitchFamily="18" charset="0"/>
+                                </a:rPr>
+                              </m:ctrlPr>
+                            </m:sSubPr>
+                            <m:e>
+                              <m:r>
+                                <a:rPr lang="fr-BE" sz="1400" b="0" i="1" smtClean="0">
+                                  <a:latin typeface="Cambria Math" panose="02040503050406030204" pitchFamily="18" charset="0"/>
+                                </a:rPr>
+                                <m:t>𝑁</m:t>
+                              </m:r>
+                            </m:e>
+                            <m:sub>
+                              <m:r>
+                                <a:rPr lang="fr-BE" sz="1400" b="0" i="1" smtClean="0">
+                                  <a:latin typeface="Cambria Math" panose="02040503050406030204" pitchFamily="18" charset="0"/>
+                                </a:rPr>
+                                <m:t>𝑝𝑎𝑟</m:t>
+                              </m:r>
+                            </m:sub>
+                          </m:sSub>
+                        </m:sub>
+                      </m:sSub>
+                    </m:oMath>
+                  </m:oMathPara>
+                </a14:m>
+                <a:endParaRPr lang="fr-FR" dirty="0"/>
+              </a:p>
+            </p:txBody>
+          </p:sp>
+        </mc:Choice>
+        <mc:Fallback>
+          <p:sp>
+            <p:nvSpPr>
+              <p:cNvPr id="8" name="Rectangle 7">
+                <a:extLst>
+                  <a:ext uri="{FF2B5EF4-FFF2-40B4-BE49-F238E27FC236}">
+                    <a16:creationId xmlns:a16="http://schemas.microsoft.com/office/drawing/2014/main" id="{B549C5C0-E7A0-4490-A797-0D92AE4DC140}"/>
+                  </a:ext>
+                </a:extLst>
+              </p:cNvPr>
+              <p:cNvSpPr>
+                <a:spLocks noRot="1" noChangeAspect="1" noMove="1" noResize="1" noEditPoints="1" noAdjustHandles="1" noChangeArrowheads="1" noChangeShapeType="1" noTextEdit="1"/>
+              </p:cNvSpPr>
+              <p:nvPr/>
+            </p:nvSpPr>
+            <p:spPr>
+              <a:xfrm>
+                <a:off x="4877386" y="2568222"/>
+                <a:ext cx="609988" cy="609988"/>
+              </a:xfrm>
+              <a:prstGeom prst="rect">
+                <a:avLst/>
+              </a:prstGeom>
+              <a:blipFill>
+                <a:blip r:embed="rId5"/>
+                <a:stretch>
+                  <a:fillRect l="-3922"/>
+                </a:stretch>
+              </a:blipFill>
+              <a:ln w="9525" cap="flat" cmpd="sng" algn="ctr">
+                <a:solidFill>
+                  <a:schemeClr val="dk1"/>
+                </a:solidFill>
+                <a:prstDash val="solid"/>
+                <a:round/>
+                <a:headEnd type="none" w="med" len="med"/>
+                <a:tailEnd type="none" w="med" len="med"/>
+              </a:ln>
+            </p:spPr>
+            <p:txBody>
+              <a:bodyPr/>
+              <a:lstStyle/>
+              <a:p>
+                <a:r>
+                  <a:rPr lang="fr-FR">
+                    <a:noFill/>
+                  </a:rPr>
+                  <a:t> </a:t>
+                </a:r>
+              </a:p>
+            </p:txBody>
+          </p:sp>
+        </mc:Fallback>
+      </mc:AlternateContent>
+      <p:cxnSp>
+        <p:nvCxnSpPr>
+          <p:cNvPr id="10" name="Connecteur droit avec flèche 9">
+            <a:extLst>
+              <a:ext uri="{FF2B5EF4-FFF2-40B4-BE49-F238E27FC236}">
+                <a16:creationId xmlns:a16="http://schemas.microsoft.com/office/drawing/2014/main" id="{294EF449-1D32-4F57-A4E1-BC3F8318EEF7}"/>
+              </a:ext>
+            </a:extLst>
+          </p:cNvPr>
+          <p:cNvCxnSpPr>
+            <a:cxnSpLocks/>
+          </p:cNvCxnSpPr>
+          <p:nvPr/>
+        </p:nvCxnSpPr>
+        <p:spPr>
+          <a:xfrm flipV="1">
+            <a:off x="3046521" y="2459547"/>
+            <a:ext cx="2442042" cy="1"/>
+          </a:xfrm>
+          <a:prstGeom prst="straightConnector1">
+            <a:avLst/>
+          </a:prstGeom>
+          <a:ln w="28575">
+            <a:solidFill>
+              <a:schemeClr val="tx1"/>
+            </a:solidFill>
+            <a:headEnd type="triangle"/>
+            <a:tailEnd type="triangle"/>
+          </a:ln>
+        </p:spPr>
+        <p:style>
+          <a:lnRef idx="1">
+            <a:schemeClr val="accent1"/>
+          </a:lnRef>
+          <a:fillRef idx="0">
+            <a:schemeClr val="accent1"/>
+          </a:fillRef>
+          <a:effectRef idx="0">
+            <a:schemeClr val="accent1"/>
+          </a:effectRef>
+          <a:fontRef idx="minor">
+            <a:schemeClr val="tx1"/>
+          </a:fontRef>
+        </p:style>
+      </p:cxnSp>
+      <mc:AlternateContent xmlns:mc="http://schemas.openxmlformats.org/markup-compatibility/2006">
+        <mc:Choice xmlns:a14="http://schemas.microsoft.com/office/drawing/2010/main" Requires="a14">
+          <p:sp>
+            <p:nvSpPr>
+              <p:cNvPr id="13" name="ZoneTexte 12">
+                <a:extLst>
+                  <a:ext uri="{FF2B5EF4-FFF2-40B4-BE49-F238E27FC236}">
+                    <a16:creationId xmlns:a16="http://schemas.microsoft.com/office/drawing/2014/main" id="{3E1756D5-125E-407F-915B-A1B61B5D7C51}"/>
+                  </a:ext>
+                </a:extLst>
+              </p:cNvPr>
+              <p:cNvSpPr txBox="1"/>
+              <p:nvPr/>
+            </p:nvSpPr>
+            <p:spPr>
+              <a:xfrm>
+                <a:off x="3046520" y="1915778"/>
+                <a:ext cx="2442042" cy="551740"/>
+              </a:xfrm>
+              <a:prstGeom prst="rect">
+                <a:avLst/>
+              </a:prstGeom>
+              <a:noFill/>
+            </p:spPr>
+            <p:txBody>
+              <a:bodyPr wrap="square" rtlCol="0" anchor="ctr">
+                <a:spAutoFit/>
+              </a:bodyPr>
+              <a:lstStyle/>
+              <a:p>
+                <a:pPr algn="ctr"/>
+                <a14:m>
+                  <m:oMath xmlns:m="http://schemas.openxmlformats.org/officeDocument/2006/math">
+                    <m:sSub>
+                      <m:sSubPr>
+                        <m:ctrlPr>
+                          <a:rPr lang="fr-BE" b="0" i="1" smtClean="0">
+                            <a:latin typeface="Cambria Math" panose="02040503050406030204" pitchFamily="18" charset="0"/>
+                          </a:rPr>
+                        </m:ctrlPr>
+                      </m:sSubPr>
+                      <m:e>
+                        <m:r>
+                          <a:rPr lang="fr-BE" b="0" i="1" smtClean="0">
+                            <a:latin typeface="Cambria Math" panose="02040503050406030204" pitchFamily="18" charset="0"/>
+                          </a:rPr>
+                          <m:t>𝑁</m:t>
+                        </m:r>
+                      </m:e>
+                      <m:sub>
+                        <m:r>
+                          <a:rPr lang="fr-BE" b="0" i="1" smtClean="0">
+                            <a:latin typeface="Cambria Math" panose="02040503050406030204" pitchFamily="18" charset="0"/>
+                          </a:rPr>
+                          <m:t>𝑝𝑎𝑟</m:t>
+                        </m:r>
+                      </m:sub>
+                    </m:sSub>
+                  </m:oMath>
+                </a14:m>
+                <a:r>
+                  <a:rPr lang="fr-FR" dirty="0"/>
+                  <a:t> pixels</a:t>
+                </a:r>
+              </a:p>
+            </p:txBody>
+          </p:sp>
+        </mc:Choice>
+        <mc:Fallback>
+          <p:sp>
+            <p:nvSpPr>
+              <p:cNvPr id="13" name="ZoneTexte 12">
+                <a:extLst>
+                  <a:ext uri="{FF2B5EF4-FFF2-40B4-BE49-F238E27FC236}">
+                    <a16:creationId xmlns:a16="http://schemas.microsoft.com/office/drawing/2014/main" id="{3E1756D5-125E-407F-915B-A1B61B5D7C51}"/>
+                  </a:ext>
+                </a:extLst>
+              </p:cNvPr>
+              <p:cNvSpPr txBox="1">
+                <a:spLocks noRot="1" noChangeAspect="1" noMove="1" noResize="1" noEditPoints="1" noAdjustHandles="1" noChangeArrowheads="1" noChangeShapeType="1" noTextEdit="1"/>
+              </p:cNvSpPr>
+              <p:nvPr/>
+            </p:nvSpPr>
+            <p:spPr>
+              <a:xfrm>
+                <a:off x="3046520" y="1915778"/>
+                <a:ext cx="2442042" cy="551740"/>
+              </a:xfrm>
+              <a:prstGeom prst="rect">
+                <a:avLst/>
+              </a:prstGeom>
+              <a:blipFill>
+                <a:blip r:embed="rId6"/>
+                <a:stretch>
+                  <a:fillRect/>
+                </a:stretch>
+              </a:blipFill>
+            </p:spPr>
+            <p:txBody>
+              <a:bodyPr/>
+              <a:lstStyle/>
+              <a:p>
+                <a:r>
+                  <a:rPr lang="fr-FR">
+                    <a:noFill/>
+                  </a:rPr>
+                  <a:t> </a:t>
+                </a:r>
+              </a:p>
+            </p:txBody>
+          </p:sp>
+        </mc:Fallback>
+      </mc:AlternateContent>
+      <p:sp>
+        <p:nvSpPr>
+          <p:cNvPr id="20" name="Trapèze 19">
+            <a:extLst>
+              <a:ext uri="{FF2B5EF4-FFF2-40B4-BE49-F238E27FC236}">
+                <a16:creationId xmlns:a16="http://schemas.microsoft.com/office/drawing/2014/main" id="{40957FD1-D69A-4EE1-9EA6-42E79AAF4716}"/>
+              </a:ext>
+            </a:extLst>
+          </p:cNvPr>
+          <p:cNvSpPr/>
+          <p:nvPr/>
+        </p:nvSpPr>
+        <p:spPr>
+          <a:xfrm rot="10800000">
+            <a:off x="3046521" y="3788198"/>
+            <a:ext cx="2440853" cy="144085"/>
+          </a:xfrm>
+          <a:prstGeom prst="trapezoid">
+            <a:avLst/>
+          </a:prstGeom>
+          <a:ln w="28575">
+            <a:headEnd type="none" w="med" len="med"/>
+            <a:tailEnd type="none" w="med" len="med"/>
+          </a:ln>
+        </p:spPr>
+        <p:style>
+          <a:lnRef idx="2">
+            <a:schemeClr val="dk1"/>
+          </a:lnRef>
+          <a:fillRef idx="1">
+            <a:schemeClr val="lt1"/>
+          </a:fillRef>
+          <a:effectRef idx="0">
+            <a:schemeClr val="dk1"/>
+          </a:effectRef>
+          <a:fontRef idx="minor">
+            <a:schemeClr val="dk1"/>
+          </a:fontRef>
+        </p:style>
+        <p:txBody>
+          <a:bodyPr rtlCol="0" anchor="ctr"/>
+          <a:lstStyle/>
+          <a:p>
+            <a:pPr algn="ctr"/>
+            <a:endParaRPr lang="fr-FR"/>
+          </a:p>
+        </p:txBody>
+      </p:sp>
+      <p:cxnSp>
+        <p:nvCxnSpPr>
+          <p:cNvPr id="25" name="Connecteur droit avec flèche 24">
+            <a:extLst>
+              <a:ext uri="{FF2B5EF4-FFF2-40B4-BE49-F238E27FC236}">
+                <a16:creationId xmlns:a16="http://schemas.microsoft.com/office/drawing/2014/main" id="{4E5F135A-51D9-4FA6-9189-B1DBAC69D289}"/>
+              </a:ext>
+            </a:extLst>
+          </p:cNvPr>
+          <p:cNvCxnSpPr>
+            <a:cxnSpLocks/>
+            <a:stCxn id="4" idx="2"/>
+          </p:cNvCxnSpPr>
+          <p:nvPr/>
+        </p:nvCxnSpPr>
+        <p:spPr>
+          <a:xfrm>
+            <a:off x="3351515" y="3178211"/>
+            <a:ext cx="0" cy="590225"/>
+          </a:xfrm>
+          <a:prstGeom prst="straightConnector1">
+            <a:avLst/>
+          </a:prstGeom>
+          <a:ln>
+            <a:tailEnd type="triangle"/>
+          </a:ln>
+        </p:spPr>
+        <p:style>
+          <a:lnRef idx="1">
+            <a:schemeClr val="dk1"/>
+          </a:lnRef>
+          <a:fillRef idx="0">
+            <a:schemeClr val="dk1"/>
+          </a:fillRef>
+          <a:effectRef idx="0">
+            <a:schemeClr val="dk1"/>
+          </a:effectRef>
+          <a:fontRef idx="minor">
+            <a:schemeClr val="tx1"/>
+          </a:fontRef>
+        </p:style>
+      </p:cxnSp>
+      <p:cxnSp>
+        <p:nvCxnSpPr>
+          <p:cNvPr id="28" name="Connecteur droit avec flèche 27">
+            <a:extLst>
+              <a:ext uri="{FF2B5EF4-FFF2-40B4-BE49-F238E27FC236}">
+                <a16:creationId xmlns:a16="http://schemas.microsoft.com/office/drawing/2014/main" id="{D4E5CAF4-3986-4CC9-ADE3-CD8A651BCE3D}"/>
+              </a:ext>
+            </a:extLst>
+          </p:cNvPr>
+          <p:cNvCxnSpPr>
+            <a:cxnSpLocks/>
+            <a:stCxn id="2" idx="2"/>
+          </p:cNvCxnSpPr>
+          <p:nvPr/>
+        </p:nvCxnSpPr>
+        <p:spPr>
+          <a:xfrm flipH="1">
+            <a:off x="3961502" y="3178211"/>
+            <a:ext cx="1" cy="590225"/>
+          </a:xfrm>
+          <a:prstGeom prst="straightConnector1">
+            <a:avLst/>
+          </a:prstGeom>
+          <a:ln>
+            <a:tailEnd type="triangle"/>
+          </a:ln>
+        </p:spPr>
+        <p:style>
+          <a:lnRef idx="1">
+            <a:schemeClr val="accent1"/>
+          </a:lnRef>
+          <a:fillRef idx="0">
+            <a:schemeClr val="accent1"/>
+          </a:fillRef>
+          <a:effectRef idx="0">
+            <a:schemeClr val="accent1"/>
+          </a:effectRef>
+          <a:fontRef idx="minor">
+            <a:schemeClr val="tx1"/>
+          </a:fontRef>
+        </p:style>
+      </p:cxnSp>
+      <p:cxnSp>
+        <p:nvCxnSpPr>
+          <p:cNvPr id="31" name="Connecteur droit avec flèche 30">
+            <a:extLst>
+              <a:ext uri="{FF2B5EF4-FFF2-40B4-BE49-F238E27FC236}">
+                <a16:creationId xmlns:a16="http://schemas.microsoft.com/office/drawing/2014/main" id="{7D8BD6B5-F041-47DB-B429-5EC2DA515F40}"/>
+              </a:ext>
+            </a:extLst>
+          </p:cNvPr>
+          <p:cNvCxnSpPr>
+            <a:cxnSpLocks/>
+          </p:cNvCxnSpPr>
+          <p:nvPr/>
+        </p:nvCxnSpPr>
+        <p:spPr>
+          <a:xfrm flipH="1">
+            <a:off x="4571489" y="3178211"/>
+            <a:ext cx="1" cy="590225"/>
+          </a:xfrm>
+          <a:prstGeom prst="straightConnector1">
+            <a:avLst/>
+          </a:prstGeom>
+          <a:ln>
+            <a:tailEnd type="triangle"/>
+          </a:ln>
+        </p:spPr>
+        <p:style>
+          <a:lnRef idx="1">
+            <a:schemeClr val="accent2"/>
+          </a:lnRef>
+          <a:fillRef idx="0">
+            <a:schemeClr val="accent2"/>
+          </a:fillRef>
+          <a:effectRef idx="0">
+            <a:schemeClr val="accent2"/>
+          </a:effectRef>
+          <a:fontRef idx="minor">
+            <a:schemeClr val="tx1"/>
+          </a:fontRef>
+        </p:style>
+      </p:cxnSp>
+      <p:cxnSp>
+        <p:nvCxnSpPr>
+          <p:cNvPr id="32" name="Connecteur droit avec flèche 31">
+            <a:extLst>
+              <a:ext uri="{FF2B5EF4-FFF2-40B4-BE49-F238E27FC236}">
+                <a16:creationId xmlns:a16="http://schemas.microsoft.com/office/drawing/2014/main" id="{C11DC4D9-811A-4975-AC27-938639CDA469}"/>
+              </a:ext>
+            </a:extLst>
+          </p:cNvPr>
+          <p:cNvCxnSpPr>
+            <a:cxnSpLocks/>
+          </p:cNvCxnSpPr>
+          <p:nvPr/>
+        </p:nvCxnSpPr>
+        <p:spPr>
+          <a:xfrm flipH="1">
+            <a:off x="5185295" y="3178210"/>
+            <a:ext cx="1" cy="590226"/>
+          </a:xfrm>
+          <a:prstGeom prst="straightConnector1">
+            <a:avLst/>
+          </a:prstGeom>
+          <a:ln>
+            <a:tailEnd type="triangle"/>
+          </a:ln>
+        </p:spPr>
+        <p:style>
+          <a:lnRef idx="1">
+            <a:schemeClr val="accent6"/>
+          </a:lnRef>
+          <a:fillRef idx="0">
+            <a:schemeClr val="accent6"/>
+          </a:fillRef>
+          <a:effectRef idx="0">
+            <a:schemeClr val="accent6"/>
+          </a:effectRef>
+          <a:fontRef idx="minor">
+            <a:schemeClr val="tx1"/>
+          </a:fontRef>
+        </p:style>
+      </p:cxnSp>
+      <p:sp>
+        <p:nvSpPr>
+          <p:cNvPr id="60" name="Trapèze 59">
+            <a:extLst>
+              <a:ext uri="{FF2B5EF4-FFF2-40B4-BE49-F238E27FC236}">
+                <a16:creationId xmlns:a16="http://schemas.microsoft.com/office/drawing/2014/main" id="{180B2646-6BB3-4015-8DF9-E5FF84D7E119}"/>
+              </a:ext>
+            </a:extLst>
+          </p:cNvPr>
+          <p:cNvSpPr/>
+          <p:nvPr/>
+        </p:nvSpPr>
+        <p:spPr>
+          <a:xfrm rot="10800000">
+            <a:off x="3655147" y="4426561"/>
+            <a:ext cx="2440853" cy="144085"/>
+          </a:xfrm>
+          <a:prstGeom prst="trapezoid">
+            <a:avLst/>
+          </a:prstGeom>
+          <a:ln w="28575">
+            <a:headEnd type="none" w="med" len="med"/>
+            <a:tailEnd type="none" w="med" len="med"/>
+          </a:ln>
+        </p:spPr>
+        <p:style>
+          <a:lnRef idx="2">
+            <a:schemeClr val="dk1"/>
+          </a:lnRef>
+          <a:fillRef idx="1">
+            <a:schemeClr val="lt1"/>
+          </a:fillRef>
+          <a:effectRef idx="0">
+            <a:schemeClr val="dk1"/>
+          </a:effectRef>
+          <a:fontRef idx="minor">
+            <a:schemeClr val="dk1"/>
+          </a:fontRef>
+        </p:style>
+        <p:txBody>
+          <a:bodyPr rtlCol="0" anchor="ctr"/>
+          <a:lstStyle/>
+          <a:p>
+            <a:pPr algn="ctr"/>
+            <a:endParaRPr lang="fr-FR"/>
+          </a:p>
+        </p:txBody>
+      </p:sp>
+      <p:grpSp>
+        <p:nvGrpSpPr>
+          <p:cNvPr id="67" name="Groupe 66">
+            <a:extLst>
+              <a:ext uri="{FF2B5EF4-FFF2-40B4-BE49-F238E27FC236}">
+                <a16:creationId xmlns:a16="http://schemas.microsoft.com/office/drawing/2014/main" id="{E6D462B0-F16B-48B2-B747-C72FC22183E9}"/>
+              </a:ext>
+            </a:extLst>
+          </p:cNvPr>
+          <p:cNvGrpSpPr/>
+          <p:nvPr/>
+        </p:nvGrpSpPr>
+        <p:grpSpPr>
+          <a:xfrm>
+            <a:off x="1056083" y="4789568"/>
+            <a:ext cx="609988" cy="609988"/>
+            <a:chOff x="538848" y="4789568"/>
+            <a:chExt cx="609988" cy="609988"/>
+          </a:xfrm>
+        </p:grpSpPr>
+        <p:sp>
+          <p:nvSpPr>
+            <p:cNvPr id="58" name="Rectangle 57">
+              <a:extLst>
+                <a:ext uri="{FF2B5EF4-FFF2-40B4-BE49-F238E27FC236}">
+                  <a16:creationId xmlns:a16="http://schemas.microsoft.com/office/drawing/2014/main" id="{3E38D997-A0BA-4B2C-B297-144AB9201F36}"/>
+                </a:ext>
+              </a:extLst>
+            </p:cNvPr>
+            <p:cNvSpPr/>
+            <p:nvPr/>
+          </p:nvSpPr>
+          <p:spPr>
+            <a:xfrm>
+              <a:off x="538848" y="4789568"/>
+              <a:ext cx="609988" cy="609988"/>
+            </a:xfrm>
+            <a:prstGeom prst="rect">
+              <a:avLst/>
+            </a:prstGeom>
+            <a:noFill/>
+            <a:ln w="9525" cap="flat" cmpd="sng" algn="ctr">
+              <a:solidFill>
+                <a:schemeClr val="dk1"/>
+              </a:solidFill>
+              <a:prstDash val="solid"/>
+              <a:round/>
+              <a:headEnd type="none" w="med" len="med"/>
+              <a:tailEnd type="none" w="med" len="med"/>
+            </a:ln>
+          </p:spPr>
+          <p:style>
+            <a:lnRef idx="0">
+              <a:scrgbClr r="0" g="0" b="0"/>
+            </a:lnRef>
+            <a:fillRef idx="0">
+              <a:scrgbClr r="0" g="0" b="0"/>
+            </a:fillRef>
+            <a:effectRef idx="0">
+              <a:scrgbClr r="0" g="0" b="0"/>
+            </a:effectRef>
+            <a:fontRef idx="minor">
+              <a:schemeClr val="dk1"/>
+            </a:fontRef>
+          </p:style>
+          <p:txBody>
+            <a:bodyPr rtlCol="0" anchor="ctr"/>
+            <a:lstStyle/>
+            <a:p>
+              <a:pPr algn="ctr"/>
+              <a:endParaRPr lang="fr-BE" sz="1700" dirty="0"/>
+            </a:p>
+            <a:p>
+              <a:pPr algn="ctr"/>
+              <a:r>
+                <a:rPr lang="fr-BE" sz="1700" dirty="0"/>
+                <a:t>val</a:t>
+              </a:r>
+              <a:endParaRPr lang="fr-FR" sz="1700" dirty="0"/>
+            </a:p>
+          </p:txBody>
+        </p:sp>
+        <p:sp>
+          <p:nvSpPr>
+            <p:cNvPr id="62" name="Rectangle 61">
+              <a:extLst>
+                <a:ext uri="{FF2B5EF4-FFF2-40B4-BE49-F238E27FC236}">
+                  <a16:creationId xmlns:a16="http://schemas.microsoft.com/office/drawing/2014/main" id="{92DFEF8E-5128-4DE3-AAB9-255F653BBC1B}"/>
+                </a:ext>
+              </a:extLst>
+            </p:cNvPr>
+            <p:cNvSpPr/>
+            <p:nvPr/>
+          </p:nvSpPr>
+          <p:spPr>
+            <a:xfrm>
+              <a:off x="538848" y="4789568"/>
+              <a:ext cx="609988" cy="229494"/>
+            </a:xfrm>
+            <a:prstGeom prst="rect">
+              <a:avLst/>
+            </a:prstGeom>
+            <a:ln>
+              <a:headEnd type="none" w="med" len="med"/>
+              <a:tailEnd type="none" w="med" len="med"/>
+            </a:ln>
+          </p:spPr>
+          <p:style>
+            <a:lnRef idx="2">
+              <a:schemeClr val="accent3">
+                <a:shade val="50000"/>
+              </a:schemeClr>
+            </a:lnRef>
+            <a:fillRef idx="1">
+              <a:schemeClr val="accent3"/>
+            </a:fillRef>
+            <a:effectRef idx="0">
+              <a:schemeClr val="accent3"/>
+            </a:effectRef>
+            <a:fontRef idx="minor">
+              <a:schemeClr val="lt1"/>
+            </a:fontRef>
+          </p:style>
+          <p:txBody>
+            <a:bodyPr rtlCol="0" anchor="ctr"/>
+            <a:lstStyle/>
+            <a:p>
+              <a:pPr algn="ctr"/>
+              <a:r>
+                <a:rPr lang="fr-BE" sz="1700" dirty="0"/>
+                <a:t>pos</a:t>
+              </a:r>
+              <a:endParaRPr lang="fr-FR" sz="1700" dirty="0"/>
+            </a:p>
+          </p:txBody>
+        </p:sp>
+      </p:grpSp>
+      <p:cxnSp>
+        <p:nvCxnSpPr>
+          <p:cNvPr id="64" name="Connecteur : en angle 63">
+            <a:extLst>
+              <a:ext uri="{FF2B5EF4-FFF2-40B4-BE49-F238E27FC236}">
+                <a16:creationId xmlns:a16="http://schemas.microsoft.com/office/drawing/2014/main" id="{3A588437-6A31-4400-942A-12541AF54B76}"/>
+              </a:ext>
+            </a:extLst>
+          </p:cNvPr>
+          <p:cNvCxnSpPr>
+            <a:stCxn id="62" idx="3"/>
+            <a:endCxn id="20" idx="3"/>
+          </p:cNvCxnSpPr>
+          <p:nvPr/>
+        </p:nvCxnSpPr>
+        <p:spPr>
+          <a:xfrm flipV="1">
+            <a:off x="1666071" y="3860240"/>
+            <a:ext cx="1398461" cy="1044075"/>
+          </a:xfrm>
+          <a:prstGeom prst="bentConnector3">
+            <a:avLst/>
+          </a:prstGeom>
+          <a:ln w="28575">
+            <a:tailEnd type="triangle"/>
+          </a:ln>
+        </p:spPr>
+        <p:style>
+          <a:lnRef idx="1">
+            <a:schemeClr val="accent3"/>
+          </a:lnRef>
+          <a:fillRef idx="0">
+            <a:schemeClr val="accent3"/>
+          </a:fillRef>
+          <a:effectRef idx="0">
+            <a:schemeClr val="accent3"/>
+          </a:effectRef>
+          <a:fontRef idx="minor">
+            <a:schemeClr val="tx1"/>
+          </a:fontRef>
+        </p:style>
+      </p:cxnSp>
+      <p:sp>
+        <p:nvSpPr>
+          <p:cNvPr id="68" name="Organigramme : Jonction de sommaire 67">
+            <a:extLst>
+              <a:ext uri="{FF2B5EF4-FFF2-40B4-BE49-F238E27FC236}">
+                <a16:creationId xmlns:a16="http://schemas.microsoft.com/office/drawing/2014/main" id="{A5E26A9C-66E6-4242-A856-50C0F4FC76C5}"/>
+              </a:ext>
+            </a:extLst>
+          </p:cNvPr>
+          <p:cNvSpPr/>
+          <p:nvPr/>
+        </p:nvSpPr>
+        <p:spPr>
+          <a:xfrm>
+            <a:off x="3189515" y="5041440"/>
+            <a:ext cx="324000" cy="324000"/>
+          </a:xfrm>
+          <a:prstGeom prst="flowChartSummingJunction">
+            <a:avLst/>
+          </a:prstGeom>
+        </p:spPr>
+        <p:style>
+          <a:lnRef idx="2">
+            <a:schemeClr val="dk1"/>
+          </a:lnRef>
+          <a:fillRef idx="1">
+            <a:schemeClr val="lt1"/>
+          </a:fillRef>
+          <a:effectRef idx="0">
+            <a:schemeClr val="dk1"/>
+          </a:effectRef>
+          <a:fontRef idx="minor">
+            <a:schemeClr val="dk1"/>
+          </a:fontRef>
+        </p:style>
+        <p:txBody>
+          <a:bodyPr rtlCol="0" anchor="ctr"/>
+          <a:lstStyle/>
+          <a:p>
+            <a:pPr algn="ctr"/>
+            <a:endParaRPr lang="fr-FR"/>
+          </a:p>
+        </p:txBody>
+      </p:sp>
+      <p:grpSp>
+        <p:nvGrpSpPr>
+          <p:cNvPr id="78" name="Groupe 77">
+            <a:extLst>
+              <a:ext uri="{FF2B5EF4-FFF2-40B4-BE49-F238E27FC236}">
+                <a16:creationId xmlns:a16="http://schemas.microsoft.com/office/drawing/2014/main" id="{0A30D976-DF52-406D-9DFE-F5CB12C3D1CB}"/>
+              </a:ext>
+            </a:extLst>
+          </p:cNvPr>
+          <p:cNvGrpSpPr/>
+          <p:nvPr/>
+        </p:nvGrpSpPr>
+        <p:grpSpPr>
+          <a:xfrm>
+            <a:off x="1056083" y="5698681"/>
+            <a:ext cx="609988" cy="609988"/>
+            <a:chOff x="538848" y="4789568"/>
+            <a:chExt cx="609988" cy="609988"/>
+          </a:xfrm>
+        </p:grpSpPr>
+        <p:sp>
+          <p:nvSpPr>
+            <p:cNvPr id="79" name="Rectangle 78">
+              <a:extLst>
+                <a:ext uri="{FF2B5EF4-FFF2-40B4-BE49-F238E27FC236}">
+                  <a16:creationId xmlns:a16="http://schemas.microsoft.com/office/drawing/2014/main" id="{CE339710-1C78-46E5-ACF6-F51065DA352C}"/>
+                </a:ext>
+              </a:extLst>
+            </p:cNvPr>
+            <p:cNvSpPr/>
+            <p:nvPr/>
+          </p:nvSpPr>
+          <p:spPr>
+            <a:xfrm>
+              <a:off x="538848" y="4789568"/>
+              <a:ext cx="609988" cy="609988"/>
+            </a:xfrm>
+            <a:prstGeom prst="rect">
+              <a:avLst/>
+            </a:prstGeom>
+            <a:noFill/>
+            <a:ln w="9525" cap="flat" cmpd="sng" algn="ctr">
+              <a:solidFill>
+                <a:schemeClr val="dk1"/>
+              </a:solidFill>
+              <a:prstDash val="solid"/>
+              <a:round/>
+              <a:headEnd type="none" w="med" len="med"/>
+              <a:tailEnd type="none" w="med" len="med"/>
+            </a:ln>
+          </p:spPr>
+          <p:style>
+            <a:lnRef idx="0">
+              <a:scrgbClr r="0" g="0" b="0"/>
+            </a:lnRef>
+            <a:fillRef idx="0">
+              <a:scrgbClr r="0" g="0" b="0"/>
+            </a:fillRef>
+            <a:effectRef idx="0">
+              <a:scrgbClr r="0" g="0" b="0"/>
+            </a:effectRef>
+            <a:fontRef idx="minor">
+              <a:schemeClr val="dk1"/>
+            </a:fontRef>
+          </p:style>
+          <p:txBody>
+            <a:bodyPr rtlCol="0" anchor="ctr"/>
+            <a:lstStyle/>
+            <a:p>
+              <a:pPr algn="ctr"/>
+              <a:endParaRPr lang="fr-BE" sz="1700" dirty="0"/>
+            </a:p>
+            <a:p>
+              <a:pPr algn="ctr"/>
+              <a:r>
+                <a:rPr lang="fr-BE" sz="1700" dirty="0"/>
+                <a:t>val</a:t>
+              </a:r>
+              <a:endParaRPr lang="fr-FR" sz="1700" dirty="0"/>
+            </a:p>
+          </p:txBody>
+        </p:sp>
+        <p:sp>
+          <p:nvSpPr>
+            <p:cNvPr id="80" name="Rectangle 79">
+              <a:extLst>
+                <a:ext uri="{FF2B5EF4-FFF2-40B4-BE49-F238E27FC236}">
+                  <a16:creationId xmlns:a16="http://schemas.microsoft.com/office/drawing/2014/main" id="{E501E127-619F-47C0-B201-AE7827086F48}"/>
+                </a:ext>
+              </a:extLst>
+            </p:cNvPr>
+            <p:cNvSpPr/>
+            <p:nvPr/>
+          </p:nvSpPr>
+          <p:spPr>
+            <a:xfrm>
+              <a:off x="538848" y="4789568"/>
+              <a:ext cx="609988" cy="229494"/>
+            </a:xfrm>
+            <a:prstGeom prst="rect">
+              <a:avLst/>
+            </a:prstGeom>
+            <a:ln>
+              <a:headEnd type="none" w="med" len="med"/>
+              <a:tailEnd type="none" w="med" len="med"/>
+            </a:ln>
+          </p:spPr>
+          <p:style>
+            <a:lnRef idx="2">
+              <a:schemeClr val="accent3">
+                <a:shade val="50000"/>
+              </a:schemeClr>
+            </a:lnRef>
+            <a:fillRef idx="1">
+              <a:schemeClr val="accent3"/>
+            </a:fillRef>
+            <a:effectRef idx="0">
+              <a:schemeClr val="accent3"/>
+            </a:effectRef>
+            <a:fontRef idx="minor">
+              <a:schemeClr val="lt1"/>
+            </a:fontRef>
+          </p:style>
+          <p:txBody>
+            <a:bodyPr rtlCol="0" anchor="ctr"/>
+            <a:lstStyle/>
+            <a:p>
+              <a:pPr algn="ctr"/>
+              <a:r>
+                <a:rPr lang="fr-BE" sz="1700" dirty="0"/>
+                <a:t>pos</a:t>
+              </a:r>
+              <a:endParaRPr lang="fr-FR" sz="1700" dirty="0"/>
+            </a:p>
+          </p:txBody>
+        </p:sp>
+      </p:grpSp>
+      <p:sp>
+        <p:nvSpPr>
+          <p:cNvPr id="82" name="Organigramme : Jonction de sommaire 81">
+            <a:extLst>
+              <a:ext uri="{FF2B5EF4-FFF2-40B4-BE49-F238E27FC236}">
+                <a16:creationId xmlns:a16="http://schemas.microsoft.com/office/drawing/2014/main" id="{AB4CA842-A42A-4CD0-840D-92EB41435BBC}"/>
+              </a:ext>
+            </a:extLst>
+          </p:cNvPr>
+          <p:cNvSpPr/>
+          <p:nvPr/>
+        </p:nvSpPr>
+        <p:spPr>
+          <a:xfrm>
+            <a:off x="3799502" y="5967583"/>
+            <a:ext cx="324000" cy="324000"/>
+          </a:xfrm>
+          <a:prstGeom prst="flowChartSummingJunction">
+            <a:avLst/>
+          </a:prstGeom>
+        </p:spPr>
+        <p:style>
+          <a:lnRef idx="2">
+            <a:schemeClr val="dk1"/>
+          </a:lnRef>
+          <a:fillRef idx="1">
+            <a:schemeClr val="lt1"/>
+          </a:fillRef>
+          <a:effectRef idx="0">
+            <a:schemeClr val="dk1"/>
+          </a:effectRef>
+          <a:fontRef idx="minor">
+            <a:schemeClr val="dk1"/>
+          </a:fontRef>
+        </p:style>
+        <p:txBody>
+          <a:bodyPr rtlCol="0" anchor="ctr"/>
+          <a:lstStyle/>
+          <a:p>
+            <a:pPr algn="ctr"/>
+            <a:endParaRPr lang="fr-FR"/>
+          </a:p>
+        </p:txBody>
+      </p:sp>
+      <p:cxnSp>
+        <p:nvCxnSpPr>
+          <p:cNvPr id="83" name="Connecteur droit avec flèche 82">
+            <a:extLst>
+              <a:ext uri="{FF2B5EF4-FFF2-40B4-BE49-F238E27FC236}">
+                <a16:creationId xmlns:a16="http://schemas.microsoft.com/office/drawing/2014/main" id="{C3C9F8A9-02D8-428F-8890-A3B113F3583F}"/>
+              </a:ext>
+            </a:extLst>
+          </p:cNvPr>
+          <p:cNvCxnSpPr>
+            <a:cxnSpLocks/>
+            <a:endCxn id="82" idx="2"/>
+          </p:cNvCxnSpPr>
+          <p:nvPr/>
+        </p:nvCxnSpPr>
+        <p:spPr>
+          <a:xfrm flipV="1">
+            <a:off x="1666071" y="6129583"/>
+            <a:ext cx="2133431" cy="23083"/>
+          </a:xfrm>
+          <a:prstGeom prst="straightConnector1">
+            <a:avLst/>
+          </a:prstGeom>
+          <a:ln>
+            <a:tailEnd type="triangle"/>
+          </a:ln>
+        </p:spPr>
+        <p:style>
+          <a:lnRef idx="1">
+            <a:schemeClr val="dk1"/>
+          </a:lnRef>
+          <a:fillRef idx="0">
+            <a:schemeClr val="dk1"/>
+          </a:fillRef>
+          <a:effectRef idx="0">
+            <a:schemeClr val="dk1"/>
+          </a:effectRef>
+          <a:fontRef idx="minor">
+            <a:schemeClr val="tx1"/>
+          </a:fontRef>
+        </p:style>
+      </p:cxnSp>
+      <p:cxnSp>
+        <p:nvCxnSpPr>
+          <p:cNvPr id="87" name="Connecteur : en angle 86">
+            <a:extLst>
+              <a:ext uri="{FF2B5EF4-FFF2-40B4-BE49-F238E27FC236}">
+                <a16:creationId xmlns:a16="http://schemas.microsoft.com/office/drawing/2014/main" id="{80B12DCF-BB1A-401F-837B-F9EE84694134}"/>
+              </a:ext>
+            </a:extLst>
+          </p:cNvPr>
+          <p:cNvCxnSpPr>
+            <a:cxnSpLocks/>
+            <a:stCxn id="80" idx="3"/>
+            <a:endCxn id="60" idx="3"/>
+          </p:cNvCxnSpPr>
+          <p:nvPr/>
+        </p:nvCxnSpPr>
+        <p:spPr>
+          <a:xfrm flipV="1">
+            <a:off x="1666071" y="4498603"/>
+            <a:ext cx="2007087" cy="1314825"/>
+          </a:xfrm>
+          <a:prstGeom prst="bentConnector3">
+            <a:avLst>
+              <a:gd name="adj1" fmla="val 50000"/>
+            </a:avLst>
+          </a:prstGeom>
+          <a:ln w="28575">
+            <a:tailEnd type="triangle"/>
+          </a:ln>
+        </p:spPr>
+        <p:style>
+          <a:lnRef idx="1">
+            <a:schemeClr val="accent3"/>
+          </a:lnRef>
+          <a:fillRef idx="0">
+            <a:schemeClr val="accent3"/>
+          </a:fillRef>
+          <a:effectRef idx="0">
+            <a:schemeClr val="accent3"/>
+          </a:effectRef>
+          <a:fontRef idx="minor">
+            <a:schemeClr val="tx1"/>
+          </a:fontRef>
+        </p:style>
+      </p:cxnSp>
+      <p:cxnSp>
+        <p:nvCxnSpPr>
+          <p:cNvPr id="90" name="Connecteur droit avec flèche 89">
+            <a:extLst>
+              <a:ext uri="{FF2B5EF4-FFF2-40B4-BE49-F238E27FC236}">
+                <a16:creationId xmlns:a16="http://schemas.microsoft.com/office/drawing/2014/main" id="{1E22361C-234A-499C-B90C-61846139832F}"/>
+              </a:ext>
+            </a:extLst>
+          </p:cNvPr>
+          <p:cNvCxnSpPr>
+            <a:cxnSpLocks/>
+            <a:endCxn id="82" idx="0"/>
+          </p:cNvCxnSpPr>
+          <p:nvPr/>
+        </p:nvCxnSpPr>
+        <p:spPr>
+          <a:xfrm>
+            <a:off x="3961502" y="4570647"/>
+            <a:ext cx="0" cy="1396936"/>
+          </a:xfrm>
+          <a:prstGeom prst="straightConnector1">
+            <a:avLst/>
+          </a:prstGeom>
+          <a:ln w="19050">
+            <a:tailEnd type="triangle"/>
+          </a:ln>
+        </p:spPr>
+        <p:style>
+          <a:lnRef idx="1">
+            <a:schemeClr val="dk1"/>
+          </a:lnRef>
+          <a:fillRef idx="0">
+            <a:schemeClr val="dk1"/>
+          </a:fillRef>
+          <a:effectRef idx="0">
+            <a:schemeClr val="dk1"/>
+          </a:effectRef>
+          <a:fontRef idx="minor">
+            <a:schemeClr val="tx1"/>
+          </a:fontRef>
+        </p:style>
+      </p:cxnSp>
+      <p:sp>
+        <p:nvSpPr>
+          <p:cNvPr id="103" name="Organigramme : Ou 102">
+            <a:extLst>
+              <a:ext uri="{FF2B5EF4-FFF2-40B4-BE49-F238E27FC236}">
+                <a16:creationId xmlns:a16="http://schemas.microsoft.com/office/drawing/2014/main" id="{EA3CA1CA-8A4B-4905-95CF-BB529D33BB4F}"/>
+              </a:ext>
+            </a:extLst>
+          </p:cNvPr>
+          <p:cNvSpPr/>
+          <p:nvPr/>
+        </p:nvSpPr>
+        <p:spPr>
+          <a:xfrm>
+            <a:off x="7116982" y="5374681"/>
+            <a:ext cx="324000" cy="324000"/>
+          </a:xfrm>
+          <a:prstGeom prst="flowChartOr">
+            <a:avLst/>
+          </a:prstGeom>
+        </p:spPr>
+        <p:style>
+          <a:lnRef idx="2">
+            <a:schemeClr val="dk1"/>
+          </a:lnRef>
+          <a:fillRef idx="1">
+            <a:schemeClr val="lt1"/>
+          </a:fillRef>
+          <a:effectRef idx="0">
+            <a:schemeClr val="dk1"/>
+          </a:effectRef>
+          <a:fontRef idx="minor">
+            <a:schemeClr val="dk1"/>
+          </a:fontRef>
+        </p:style>
+        <p:txBody>
+          <a:bodyPr rtlCol="0" anchor="ctr"/>
+          <a:lstStyle/>
+          <a:p>
+            <a:pPr algn="ctr"/>
+            <a:endParaRPr lang="fr-FR"/>
+          </a:p>
+        </p:txBody>
+      </p:sp>
+      <p:cxnSp>
+        <p:nvCxnSpPr>
+          <p:cNvPr id="110" name="Connecteur droit avec flèche 109">
+            <a:extLst>
+              <a:ext uri="{FF2B5EF4-FFF2-40B4-BE49-F238E27FC236}">
+                <a16:creationId xmlns:a16="http://schemas.microsoft.com/office/drawing/2014/main" id="{516F1E45-BF73-48BE-B0D3-64A2B0281CCD}"/>
+              </a:ext>
+            </a:extLst>
+          </p:cNvPr>
+          <p:cNvCxnSpPr>
+            <a:cxnSpLocks/>
+            <a:stCxn id="103" idx="6"/>
+            <a:endCxn id="111" idx="1"/>
+          </p:cNvCxnSpPr>
+          <p:nvPr/>
+        </p:nvCxnSpPr>
+        <p:spPr>
+          <a:xfrm>
+            <a:off x="7440982" y="5536681"/>
+            <a:ext cx="1065709" cy="0"/>
+          </a:xfrm>
+          <a:prstGeom prst="straightConnector1">
+            <a:avLst/>
+          </a:prstGeom>
+          <a:ln w="19050">
+            <a:solidFill>
+              <a:schemeClr val="tx1"/>
+            </a:solidFill>
+            <a:tailEnd type="triangle"/>
+          </a:ln>
+        </p:spPr>
+        <p:style>
+          <a:lnRef idx="1">
+            <a:schemeClr val="accent1"/>
+          </a:lnRef>
+          <a:fillRef idx="0">
+            <a:schemeClr val="accent1"/>
+          </a:fillRef>
+          <a:effectRef idx="0">
+            <a:schemeClr val="accent1"/>
+          </a:effectRef>
+          <a:fontRef idx="minor">
+            <a:schemeClr val="tx1"/>
+          </a:fontRef>
+        </p:style>
+      </p:cxnSp>
+      <p:sp>
+        <p:nvSpPr>
+          <p:cNvPr id="111" name="Rectangle 110">
+            <a:extLst>
+              <a:ext uri="{FF2B5EF4-FFF2-40B4-BE49-F238E27FC236}">
+                <a16:creationId xmlns:a16="http://schemas.microsoft.com/office/drawing/2014/main" id="{7C4456A4-F01B-496E-BE68-3B23D389F17F}"/>
+              </a:ext>
+            </a:extLst>
+          </p:cNvPr>
+          <p:cNvSpPr/>
+          <p:nvPr/>
+        </p:nvSpPr>
+        <p:spPr>
+          <a:xfrm>
+            <a:off x="8506691" y="5297505"/>
+            <a:ext cx="1431636" cy="478351"/>
+          </a:xfrm>
+          <a:prstGeom prst="rect">
+            <a:avLst/>
+          </a:prstGeom>
+          <a:noFill/>
+          <a:ln w="9525" cap="flat" cmpd="sng" algn="ctr">
+            <a:solidFill>
+              <a:schemeClr val="dk1"/>
+            </a:solidFill>
+            <a:prstDash val="solid"/>
+            <a:round/>
+            <a:headEnd type="none" w="med" len="med"/>
+            <a:tailEnd type="none" w="med" len="med"/>
+          </a:ln>
+        </p:spPr>
+        <p:style>
+          <a:lnRef idx="0">
+            <a:scrgbClr r="0" g="0" b="0"/>
+          </a:lnRef>
+          <a:fillRef idx="0">
+            <a:scrgbClr r="0" g="0" b="0"/>
+          </a:fillRef>
+          <a:effectRef idx="0">
+            <a:scrgbClr r="0" g="0" b="0"/>
+          </a:effectRef>
+          <a:fontRef idx="minor">
+            <a:schemeClr val="dk1"/>
+          </a:fontRef>
+        </p:style>
+        <p:txBody>
+          <a:bodyPr rtlCol="0" anchor="ctr"/>
+          <a:lstStyle/>
+          <a:p>
+            <a:pPr algn="ctr"/>
+            <a:r>
+              <a:rPr lang="fr-BE" dirty="0" err="1"/>
+              <a:t>Accumulator</a:t>
+            </a:r>
+            <a:endParaRPr lang="fr-FR" dirty="0"/>
+          </a:p>
+        </p:txBody>
+      </p:sp>
+      <p:cxnSp>
+        <p:nvCxnSpPr>
+          <p:cNvPr id="66" name="Connecteur droit avec flèche 65">
+            <a:extLst>
+              <a:ext uri="{FF2B5EF4-FFF2-40B4-BE49-F238E27FC236}">
+                <a16:creationId xmlns:a16="http://schemas.microsoft.com/office/drawing/2014/main" id="{A1AD13BB-C63D-49FA-A8FB-E3CC44C5265A}"/>
+              </a:ext>
+            </a:extLst>
+          </p:cNvPr>
+          <p:cNvCxnSpPr>
+            <a:cxnSpLocks/>
+            <a:endCxn id="68" idx="0"/>
+          </p:cNvCxnSpPr>
+          <p:nvPr/>
+        </p:nvCxnSpPr>
+        <p:spPr>
+          <a:xfrm>
+            <a:off x="3351515" y="3932284"/>
+            <a:ext cx="0" cy="1109156"/>
+          </a:xfrm>
+          <a:prstGeom prst="straightConnector1">
+            <a:avLst/>
+          </a:prstGeom>
+          <a:ln w="19050">
+            <a:tailEnd type="triangle"/>
+          </a:ln>
+        </p:spPr>
+        <p:style>
+          <a:lnRef idx="1">
+            <a:schemeClr val="dk1"/>
+          </a:lnRef>
+          <a:fillRef idx="0">
+            <a:schemeClr val="dk1"/>
+          </a:fillRef>
+          <a:effectRef idx="0">
+            <a:schemeClr val="dk1"/>
+          </a:effectRef>
+          <a:fontRef idx="minor">
+            <a:schemeClr val="tx1"/>
+          </a:fontRef>
+        </p:style>
+      </p:cxnSp>
+      <p:cxnSp>
+        <p:nvCxnSpPr>
+          <p:cNvPr id="73" name="Connecteur droit avec flèche 72">
+            <a:extLst>
+              <a:ext uri="{FF2B5EF4-FFF2-40B4-BE49-F238E27FC236}">
+                <a16:creationId xmlns:a16="http://schemas.microsoft.com/office/drawing/2014/main" id="{970426F7-6250-4D37-BC97-A1346D982CE1}"/>
+              </a:ext>
+            </a:extLst>
+          </p:cNvPr>
+          <p:cNvCxnSpPr>
+            <a:cxnSpLocks/>
+            <a:endCxn id="68" idx="2"/>
+          </p:cNvCxnSpPr>
+          <p:nvPr/>
+        </p:nvCxnSpPr>
+        <p:spPr>
+          <a:xfrm>
+            <a:off x="1666071" y="5203440"/>
+            <a:ext cx="1523444" cy="0"/>
+          </a:xfrm>
+          <a:prstGeom prst="straightConnector1">
+            <a:avLst/>
+          </a:prstGeom>
+          <a:ln w="19050">
+            <a:tailEnd type="triangle"/>
+          </a:ln>
+        </p:spPr>
+        <p:style>
+          <a:lnRef idx="1">
+            <a:schemeClr val="dk1"/>
+          </a:lnRef>
+          <a:fillRef idx="0">
+            <a:schemeClr val="dk1"/>
+          </a:fillRef>
+          <a:effectRef idx="0">
+            <a:schemeClr val="dk1"/>
+          </a:effectRef>
+          <a:fontRef idx="minor">
+            <a:schemeClr val="tx1"/>
+          </a:fontRef>
+        </p:style>
+      </p:cxnSp>
+      <p:cxnSp>
+        <p:nvCxnSpPr>
+          <p:cNvPr id="115" name="Connecteur : en angle 114">
+            <a:extLst>
+              <a:ext uri="{FF2B5EF4-FFF2-40B4-BE49-F238E27FC236}">
+                <a16:creationId xmlns:a16="http://schemas.microsoft.com/office/drawing/2014/main" id="{471EE9CE-400E-4D8D-841F-4CCB817ABB35}"/>
+              </a:ext>
+            </a:extLst>
+          </p:cNvPr>
+          <p:cNvCxnSpPr>
+            <a:stCxn id="68" idx="6"/>
+            <a:endCxn id="103" idx="1"/>
+          </p:cNvCxnSpPr>
+          <p:nvPr/>
+        </p:nvCxnSpPr>
+        <p:spPr>
+          <a:xfrm>
+            <a:off x="3513515" y="5203440"/>
+            <a:ext cx="3650916" cy="218690"/>
+          </a:xfrm>
+          <a:prstGeom prst="bentConnector2">
+            <a:avLst/>
+          </a:prstGeom>
+          <a:ln w="19050">
+            <a:solidFill>
+              <a:schemeClr val="tx1"/>
+            </a:solidFill>
+            <a:tailEnd type="triangle"/>
+          </a:ln>
+        </p:spPr>
+        <p:style>
+          <a:lnRef idx="1">
+            <a:schemeClr val="accent1"/>
+          </a:lnRef>
+          <a:fillRef idx="0">
+            <a:schemeClr val="accent1"/>
+          </a:fillRef>
+          <a:effectRef idx="0">
+            <a:schemeClr val="accent1"/>
+          </a:effectRef>
+          <a:fontRef idx="minor">
+            <a:schemeClr val="tx1"/>
+          </a:fontRef>
+        </p:style>
+      </p:cxnSp>
+      <p:cxnSp>
+        <p:nvCxnSpPr>
+          <p:cNvPr id="116" name="Connecteur : en angle 115">
+            <a:extLst>
+              <a:ext uri="{FF2B5EF4-FFF2-40B4-BE49-F238E27FC236}">
+                <a16:creationId xmlns:a16="http://schemas.microsoft.com/office/drawing/2014/main" id="{2BC7F2E5-4F39-4213-A34A-269614AFA709}"/>
+              </a:ext>
+            </a:extLst>
+          </p:cNvPr>
+          <p:cNvCxnSpPr>
+            <a:cxnSpLocks/>
+            <a:stCxn id="82" idx="6"/>
+            <a:endCxn id="103" idx="3"/>
+          </p:cNvCxnSpPr>
+          <p:nvPr/>
+        </p:nvCxnSpPr>
+        <p:spPr>
+          <a:xfrm flipV="1">
+            <a:off x="4123502" y="5651232"/>
+            <a:ext cx="3040929" cy="478351"/>
+          </a:xfrm>
+          <a:prstGeom prst="bentConnector2">
+            <a:avLst/>
+          </a:prstGeom>
+          <a:ln w="19050">
+            <a:solidFill>
+              <a:schemeClr val="tx1"/>
+            </a:solidFill>
+            <a:tailEnd type="triangle"/>
+          </a:ln>
+        </p:spPr>
+        <p:style>
+          <a:lnRef idx="1">
+            <a:schemeClr val="accent1"/>
+          </a:lnRef>
+          <a:fillRef idx="0">
+            <a:schemeClr val="accent1"/>
+          </a:fillRef>
+          <a:effectRef idx="0">
+            <a:schemeClr val="accent1"/>
+          </a:effectRef>
+          <a:fontRef idx="minor">
+            <a:schemeClr val="tx1"/>
+          </a:fontRef>
+        </p:style>
+      </p:cxnSp>
+      <p:cxnSp>
+        <p:nvCxnSpPr>
+          <p:cNvPr id="121" name="Connecteur droit avec flèche 120">
+            <a:extLst>
+              <a:ext uri="{FF2B5EF4-FFF2-40B4-BE49-F238E27FC236}">
+                <a16:creationId xmlns:a16="http://schemas.microsoft.com/office/drawing/2014/main" id="{131CD600-78BF-4FF6-9171-9CB46E5C48D6}"/>
+              </a:ext>
+            </a:extLst>
+          </p:cNvPr>
+          <p:cNvCxnSpPr>
+            <a:cxnSpLocks/>
+          </p:cNvCxnSpPr>
+          <p:nvPr/>
+        </p:nvCxnSpPr>
+        <p:spPr>
+          <a:xfrm flipV="1">
+            <a:off x="973156" y="4789568"/>
+            <a:ext cx="0" cy="1519101"/>
+          </a:xfrm>
+          <a:prstGeom prst="straightConnector1">
+            <a:avLst/>
+          </a:prstGeom>
+          <a:ln w="28575">
+            <a:headEnd type="triangle"/>
+            <a:tailEnd type="triangle"/>
+          </a:ln>
+        </p:spPr>
+        <p:style>
+          <a:lnRef idx="1">
+            <a:schemeClr val="dk1"/>
+          </a:lnRef>
+          <a:fillRef idx="0">
+            <a:schemeClr val="dk1"/>
+          </a:fillRef>
+          <a:effectRef idx="0">
+            <a:schemeClr val="dk1"/>
+          </a:effectRef>
+          <a:fontRef idx="minor">
+            <a:schemeClr val="tx1"/>
+          </a:fontRef>
+        </p:style>
+      </p:cxnSp>
+      <mc:AlternateContent xmlns:mc="http://schemas.openxmlformats.org/markup-compatibility/2006">
+        <mc:Choice xmlns:a14="http://schemas.microsoft.com/office/drawing/2010/main" Requires="a14">
+          <p:sp>
+            <p:nvSpPr>
+              <p:cNvPr id="123" name="ZoneTexte 122">
+                <a:extLst>
+                  <a:ext uri="{FF2B5EF4-FFF2-40B4-BE49-F238E27FC236}">
+                    <a16:creationId xmlns:a16="http://schemas.microsoft.com/office/drawing/2014/main" id="{BEDCF608-9AA1-4377-9DD6-DF52CDE14D32}"/>
+                  </a:ext>
+                </a:extLst>
+              </p:cNvPr>
+              <p:cNvSpPr txBox="1"/>
+              <p:nvPr/>
+            </p:nvSpPr>
+            <p:spPr>
+              <a:xfrm rot="16200000">
+                <a:off x="-524837" y="5353744"/>
+                <a:ext cx="2442042" cy="390748"/>
+              </a:xfrm>
+              <a:prstGeom prst="rect">
+                <a:avLst/>
+              </a:prstGeom>
+              <a:noFill/>
+            </p:spPr>
+            <p:txBody>
+              <a:bodyPr wrap="square" rtlCol="0" anchor="ctr">
+                <a:spAutoFit/>
+              </a:bodyPr>
+              <a:lstStyle/>
+              <a:p>
+                <a:pPr algn="ctr"/>
+                <a14:m>
+                  <m:oMath xmlns:m="http://schemas.openxmlformats.org/officeDocument/2006/math">
+                    <m:sSub>
+                      <m:sSubPr>
+                        <m:ctrlPr>
+                          <a:rPr lang="fr-BE" b="0" i="1" smtClean="0">
+                            <a:latin typeface="Cambria Math" panose="02040503050406030204" pitchFamily="18" charset="0"/>
+                          </a:rPr>
+                        </m:ctrlPr>
+                      </m:sSubPr>
+                      <m:e>
+                        <m:r>
+                          <a:rPr lang="fr-BE" b="0" i="1" smtClean="0">
+                            <a:latin typeface="Cambria Math" panose="02040503050406030204" pitchFamily="18" charset="0"/>
+                          </a:rPr>
+                          <m:t>𝑁</m:t>
+                        </m:r>
+                      </m:e>
+                      <m:sub>
+                        <m:r>
+                          <a:rPr lang="fr-BE" b="0" i="1" smtClean="0">
+                            <a:latin typeface="Cambria Math" panose="02040503050406030204" pitchFamily="18" charset="0"/>
+                          </a:rPr>
+                          <m:t>𝑛𝑝</m:t>
+                        </m:r>
+                      </m:sub>
+                    </m:sSub>
+                  </m:oMath>
+                </a14:m>
+                <a:r>
+                  <a:rPr lang="fr-FR" dirty="0"/>
+                  <a:t> weight</a:t>
+                </a:r>
+              </a:p>
+            </p:txBody>
+          </p:sp>
+        </mc:Choice>
+        <mc:Fallback>
+          <p:sp>
+            <p:nvSpPr>
+              <p:cNvPr id="123" name="ZoneTexte 122">
+                <a:extLst>
+                  <a:ext uri="{FF2B5EF4-FFF2-40B4-BE49-F238E27FC236}">
+                    <a16:creationId xmlns:a16="http://schemas.microsoft.com/office/drawing/2014/main" id="{BEDCF608-9AA1-4377-9DD6-DF52CDE14D32}"/>
+                  </a:ext>
+                </a:extLst>
+              </p:cNvPr>
+              <p:cNvSpPr txBox="1">
+                <a:spLocks noRot="1" noChangeAspect="1" noMove="1" noResize="1" noEditPoints="1" noAdjustHandles="1" noChangeArrowheads="1" noChangeShapeType="1" noTextEdit="1"/>
+              </p:cNvSpPr>
+              <p:nvPr/>
+            </p:nvSpPr>
+            <p:spPr>
+              <a:xfrm rot="16200000">
+                <a:off x="-524837" y="5353744"/>
+                <a:ext cx="2442042" cy="390748"/>
+              </a:xfrm>
+              <a:prstGeom prst="rect">
+                <a:avLst/>
+              </a:prstGeom>
+              <a:blipFill>
+                <a:blip r:embed="rId7"/>
+                <a:stretch>
+                  <a:fillRect l="-6250" r="-20313"/>
+                </a:stretch>
+              </a:blipFill>
+            </p:spPr>
+            <p:txBody>
+              <a:bodyPr/>
+              <a:lstStyle/>
+              <a:p>
+                <a:r>
+                  <a:rPr lang="fr-FR">
+                    <a:noFill/>
+                  </a:rPr>
+                  <a:t> </a:t>
+                </a:r>
+              </a:p>
+            </p:txBody>
+          </p:sp>
+        </mc:Fallback>
+      </mc:AlternateContent>
+      <mc:AlternateContent xmlns:mc="http://schemas.openxmlformats.org/markup-compatibility/2006">
+        <mc:Choice xmlns:a14="http://schemas.microsoft.com/office/drawing/2010/main" Requires="a14">
+          <p:sp>
+            <p:nvSpPr>
+              <p:cNvPr id="124" name="ZoneTexte 123">
+                <a:extLst>
+                  <a:ext uri="{FF2B5EF4-FFF2-40B4-BE49-F238E27FC236}">
+                    <a16:creationId xmlns:a16="http://schemas.microsoft.com/office/drawing/2014/main" id="{0082A2AD-EFA8-4FFD-B075-B70BEDED9A1D}"/>
+                  </a:ext>
+                </a:extLst>
+              </p:cNvPr>
+              <p:cNvSpPr txBox="1"/>
+              <p:nvPr/>
+            </p:nvSpPr>
+            <p:spPr>
+              <a:xfrm>
+                <a:off x="873547" y="4464559"/>
+                <a:ext cx="953458" cy="369332"/>
+              </a:xfrm>
+              <a:prstGeom prst="rect">
+                <a:avLst/>
+              </a:prstGeom>
+              <a:noFill/>
+            </p:spPr>
+            <p:txBody>
+              <a:bodyPr wrap="square" rtlCol="0">
+                <a:spAutoFit/>
+              </a:bodyPr>
+              <a:lstStyle/>
+              <a:p>
+                <a14:m>
+                  <m:oMathPara xmlns:m="http://schemas.openxmlformats.org/officeDocument/2006/math">
+                    <m:oMathParaPr>
+                      <m:jc m:val="centerGroup"/>
+                    </m:oMathParaPr>
+                    <m:oMath xmlns:m="http://schemas.openxmlformats.org/officeDocument/2006/math">
+                      <m:r>
+                        <a:rPr lang="fr-BE" b="0" i="1" smtClean="0">
+                          <a:latin typeface="Cambria Math" panose="02040503050406030204" pitchFamily="18" charset="0"/>
+                        </a:rPr>
+                        <m:t>𝑤𝑒𝑖𝑔h</m:t>
+                      </m:r>
+                      <m:sSub>
+                        <m:sSubPr>
+                          <m:ctrlPr>
+                            <a:rPr lang="fr-BE" b="0" i="1" smtClean="0">
+                              <a:latin typeface="Cambria Math" panose="02040503050406030204" pitchFamily="18" charset="0"/>
+                            </a:rPr>
+                          </m:ctrlPr>
+                        </m:sSubPr>
+                        <m:e>
+                          <m:r>
+                            <a:rPr lang="fr-BE" b="0" i="1" smtClean="0">
+                              <a:latin typeface="Cambria Math" panose="02040503050406030204" pitchFamily="18" charset="0"/>
+                            </a:rPr>
+                            <m:t>𝑡</m:t>
+                          </m:r>
+                        </m:e>
+                        <m:sub>
+                          <m:r>
+                            <a:rPr lang="fr-BE" b="0" i="1" smtClean="0">
+                              <a:latin typeface="Cambria Math" panose="02040503050406030204" pitchFamily="18" charset="0"/>
+                            </a:rPr>
+                            <m:t>1</m:t>
+                          </m:r>
+                        </m:sub>
+                      </m:sSub>
+                    </m:oMath>
+                  </m:oMathPara>
+                </a14:m>
+                <a:endParaRPr lang="fr-FR" dirty="0"/>
+              </a:p>
+            </p:txBody>
+          </p:sp>
+        </mc:Choice>
+        <mc:Fallback>
+          <p:sp>
+            <p:nvSpPr>
+              <p:cNvPr id="124" name="ZoneTexte 123">
+                <a:extLst>
+                  <a:ext uri="{FF2B5EF4-FFF2-40B4-BE49-F238E27FC236}">
+                    <a16:creationId xmlns:a16="http://schemas.microsoft.com/office/drawing/2014/main" id="{0082A2AD-EFA8-4FFD-B075-B70BEDED9A1D}"/>
+                  </a:ext>
+                </a:extLst>
+              </p:cNvPr>
+              <p:cNvSpPr txBox="1">
+                <a:spLocks noRot="1" noChangeAspect="1" noMove="1" noResize="1" noEditPoints="1" noAdjustHandles="1" noChangeArrowheads="1" noChangeShapeType="1" noTextEdit="1"/>
+              </p:cNvSpPr>
+              <p:nvPr/>
+            </p:nvSpPr>
+            <p:spPr>
+              <a:xfrm>
+                <a:off x="873547" y="4464559"/>
+                <a:ext cx="953458" cy="369332"/>
+              </a:xfrm>
+              <a:prstGeom prst="rect">
+                <a:avLst/>
+              </a:prstGeom>
+              <a:blipFill>
+                <a:blip r:embed="rId8"/>
+                <a:stretch>
+                  <a:fillRect l="-1911" b="-13115"/>
+                </a:stretch>
+              </a:blipFill>
+            </p:spPr>
+            <p:txBody>
+              <a:bodyPr/>
+              <a:lstStyle/>
+              <a:p>
+                <a:r>
+                  <a:rPr lang="fr-FR">
+                    <a:noFill/>
+                  </a:rPr>
+                  <a:t> </a:t>
+                </a:r>
+              </a:p>
+            </p:txBody>
+          </p:sp>
+        </mc:Fallback>
+      </mc:AlternateContent>
+      <mc:AlternateContent xmlns:mc="http://schemas.openxmlformats.org/markup-compatibility/2006">
+        <mc:Choice xmlns:a14="http://schemas.microsoft.com/office/drawing/2010/main" Requires="a14">
+          <p:sp>
+            <p:nvSpPr>
+              <p:cNvPr id="126" name="ZoneTexte 125">
+                <a:extLst>
+                  <a:ext uri="{FF2B5EF4-FFF2-40B4-BE49-F238E27FC236}">
+                    <a16:creationId xmlns:a16="http://schemas.microsoft.com/office/drawing/2014/main" id="{217DA402-7F3A-4007-B0A0-80425D938763}"/>
+                  </a:ext>
+                </a:extLst>
+              </p:cNvPr>
+              <p:cNvSpPr txBox="1"/>
+              <p:nvPr/>
+            </p:nvSpPr>
+            <p:spPr>
+              <a:xfrm>
+                <a:off x="968860" y="5380982"/>
+                <a:ext cx="1202393" cy="421847"/>
+              </a:xfrm>
+              <a:prstGeom prst="rect">
+                <a:avLst/>
+              </a:prstGeom>
+              <a:noFill/>
+            </p:spPr>
+            <p:txBody>
+              <a:bodyPr wrap="square" rtlCol="0">
+                <a:spAutoFit/>
+              </a:bodyPr>
+              <a:lstStyle/>
+              <a:p>
+                <a:pPr/>
+                <a14:m>
+                  <m:oMathPara xmlns:m="http://schemas.openxmlformats.org/officeDocument/2006/math">
+                    <m:oMathParaPr>
+                      <m:jc m:val="centerGroup"/>
+                    </m:oMathParaPr>
+                    <m:oMath xmlns:m="http://schemas.openxmlformats.org/officeDocument/2006/math">
+                      <m:r>
+                        <a:rPr lang="fr-BE" b="0" i="1" smtClean="0">
+                          <a:latin typeface="Cambria Math" panose="02040503050406030204" pitchFamily="18" charset="0"/>
+                        </a:rPr>
+                        <m:t>𝑤𝑒𝑖𝑔h</m:t>
+                      </m:r>
+                      <m:sSub>
+                        <m:sSubPr>
+                          <m:ctrlPr>
+                            <a:rPr lang="fr-BE" b="0" i="1" smtClean="0">
+                              <a:latin typeface="Cambria Math" panose="02040503050406030204" pitchFamily="18" charset="0"/>
+                            </a:rPr>
+                          </m:ctrlPr>
+                        </m:sSubPr>
+                        <m:e>
+                          <m:r>
+                            <a:rPr lang="fr-BE" b="0" i="1" smtClean="0">
+                              <a:latin typeface="Cambria Math" panose="02040503050406030204" pitchFamily="18" charset="0"/>
+                            </a:rPr>
+                            <m:t>𝑡</m:t>
+                          </m:r>
+                        </m:e>
+                        <m:sub>
+                          <m:sSub>
+                            <m:sSubPr>
+                              <m:ctrlPr>
+                                <a:rPr lang="fr-BE" b="0" i="1" smtClean="0">
+                                  <a:latin typeface="Cambria Math" panose="02040503050406030204" pitchFamily="18" charset="0"/>
+                                </a:rPr>
+                              </m:ctrlPr>
+                            </m:sSubPr>
+                            <m:e>
+                              <m:r>
+                                <a:rPr lang="fr-BE" b="0" i="1" smtClean="0">
+                                  <a:latin typeface="Cambria Math" panose="02040503050406030204" pitchFamily="18" charset="0"/>
+                                </a:rPr>
+                                <m:t>𝑁</m:t>
+                              </m:r>
+                            </m:e>
+                            <m:sub>
+                              <m:r>
+                                <a:rPr lang="fr-BE" b="0" i="1" smtClean="0">
+                                  <a:latin typeface="Cambria Math" panose="02040503050406030204" pitchFamily="18" charset="0"/>
+                                </a:rPr>
+                                <m:t>𝑛𝑝</m:t>
+                              </m:r>
+                            </m:sub>
+                          </m:sSub>
+                        </m:sub>
+                      </m:sSub>
+                    </m:oMath>
+                  </m:oMathPara>
+                </a14:m>
+                <a:endParaRPr lang="fr-FR" dirty="0"/>
+              </a:p>
+            </p:txBody>
+          </p:sp>
+        </mc:Choice>
+        <mc:Fallback>
+          <p:sp>
+            <p:nvSpPr>
+              <p:cNvPr id="126" name="ZoneTexte 125">
+                <a:extLst>
+                  <a:ext uri="{FF2B5EF4-FFF2-40B4-BE49-F238E27FC236}">
+                    <a16:creationId xmlns:a16="http://schemas.microsoft.com/office/drawing/2014/main" id="{217DA402-7F3A-4007-B0A0-80425D938763}"/>
+                  </a:ext>
+                </a:extLst>
+              </p:cNvPr>
+              <p:cNvSpPr txBox="1">
+                <a:spLocks noRot="1" noChangeAspect="1" noMove="1" noResize="1" noEditPoints="1" noAdjustHandles="1" noChangeArrowheads="1" noChangeShapeType="1" noTextEdit="1"/>
+              </p:cNvSpPr>
+              <p:nvPr/>
+            </p:nvSpPr>
+            <p:spPr>
+              <a:xfrm>
+                <a:off x="968860" y="5380982"/>
+                <a:ext cx="1202393" cy="421847"/>
+              </a:xfrm>
+              <a:prstGeom prst="rect">
+                <a:avLst/>
+              </a:prstGeom>
+              <a:blipFill>
+                <a:blip r:embed="rId9"/>
+                <a:stretch>
+                  <a:fillRect l="-1523" b="-2899"/>
+                </a:stretch>
+              </a:blipFill>
+            </p:spPr>
+            <p:txBody>
+              <a:bodyPr/>
+              <a:lstStyle/>
+              <a:p>
+                <a:r>
+                  <a:rPr lang="fr-FR">
+                    <a:noFill/>
+                  </a:rPr>
+                  <a:t> </a:t>
+                </a:r>
+              </a:p>
+            </p:txBody>
+          </p:sp>
+        </mc:Fallback>
+      </mc:AlternateContent>
     </p:spTree>
     <p:extLst>
       <p:ext uri="{BB962C8B-B14F-4D97-AF65-F5344CB8AC3E}">
         <p14:creationId xmlns:p14="http://schemas.microsoft.com/office/powerpoint/2010/main" val="3223594033"/>
+      </p:ext>
+    </p:extLst>
+  </p:cSld>
+  <p:clrMapOvr>
+    <a:masterClrMapping/>
+  </p:clrMapOvr>
+</p:sld>
+</file>
+
+<file path=ppt/slides/slide2.xml><?xml version="1.0" encoding="utf-8"?>
+<p:sld xmlns:a="http://schemas.openxmlformats.org/drawingml/2006/main" xmlns:r="http://schemas.openxmlformats.org/officeDocument/2006/relationships" xmlns:p="http://schemas.openxmlformats.org/presentationml/2006/main">
+  <p:cSld>
+    <p:spTree>
+      <p:nvGrpSpPr>
+        <p:cNvPr id="1" name=""/>
+        <p:cNvGrpSpPr/>
+        <p:nvPr/>
+      </p:nvGrpSpPr>
+      <p:grpSpPr>
+        <a:xfrm>
+          <a:off x="0" y="0"/>
+          <a:ext cx="0" cy="0"/>
+          <a:chOff x="0" y="0"/>
+          <a:chExt cx="0" cy="0"/>
+        </a:xfrm>
+      </p:grpSpPr>
+      <p:sp>
+        <p:nvSpPr>
+          <p:cNvPr id="4" name="Cube 3">
+            <a:extLst>
+              <a:ext uri="{FF2B5EF4-FFF2-40B4-BE49-F238E27FC236}">
+                <a16:creationId xmlns:a16="http://schemas.microsoft.com/office/drawing/2014/main" id="{0BF1AB04-9E4C-4E7B-B717-750D8E9AC8EB}"/>
+              </a:ext>
+            </a:extLst>
+          </p:cNvPr>
+          <p:cNvSpPr/>
+          <p:nvPr/>
+        </p:nvSpPr>
+        <p:spPr>
+          <a:xfrm>
+            <a:off x="3844031" y="2095129"/>
+            <a:ext cx="2628000" cy="2628000"/>
+          </a:xfrm>
+          <a:prstGeom prst="cube">
+            <a:avLst/>
+          </a:prstGeom>
+        </p:spPr>
+        <p:style>
+          <a:lnRef idx="2">
+            <a:schemeClr val="accent1">
+              <a:shade val="50000"/>
+            </a:schemeClr>
+          </a:lnRef>
+          <a:fillRef idx="1">
+            <a:schemeClr val="accent1"/>
+          </a:fillRef>
+          <a:effectRef idx="0">
+            <a:schemeClr val="accent1"/>
+          </a:effectRef>
+          <a:fontRef idx="minor">
+            <a:schemeClr val="lt1"/>
+          </a:fontRef>
+        </p:style>
+        <p:txBody>
+          <a:bodyPr rtlCol="0" anchor="ctr"/>
+          <a:lstStyle/>
+          <a:p>
+            <a:pPr algn="ctr"/>
+            <a:endParaRPr lang="fr-FR"/>
+          </a:p>
+        </p:txBody>
+      </p:sp>
+      <p:sp>
+        <p:nvSpPr>
+          <p:cNvPr id="5" name="ZoneTexte 4">
+            <a:extLst>
+              <a:ext uri="{FF2B5EF4-FFF2-40B4-BE49-F238E27FC236}">
+                <a16:creationId xmlns:a16="http://schemas.microsoft.com/office/drawing/2014/main" id="{B962AE3C-2FA5-410F-8493-DE997AB604B9}"/>
+              </a:ext>
+            </a:extLst>
+          </p:cNvPr>
+          <p:cNvSpPr txBox="1"/>
+          <p:nvPr/>
+        </p:nvSpPr>
+        <p:spPr>
+          <a:xfrm>
+            <a:off x="4329857" y="2233637"/>
+            <a:ext cx="1997476" cy="369332"/>
+          </a:xfrm>
+          <a:prstGeom prst="rect">
+            <a:avLst/>
+          </a:prstGeom>
+          <a:noFill/>
+        </p:spPr>
+        <p:txBody>
+          <a:bodyPr wrap="square" rtlCol="0">
+            <a:spAutoFit/>
+          </a:bodyPr>
+          <a:lstStyle/>
+          <a:p>
+            <a:r>
+              <a:rPr lang="fr-BE" dirty="0">
+                <a:solidFill>
+                  <a:schemeClr val="bg1"/>
+                </a:solidFill>
+              </a:rPr>
+              <a:t>Multiplier </a:t>
+            </a:r>
+            <a:r>
+              <a:rPr lang="fr-BE" dirty="0" err="1">
+                <a:solidFill>
+                  <a:schemeClr val="bg1"/>
+                </a:solidFill>
+              </a:rPr>
+              <a:t>array</a:t>
+            </a:r>
+            <a:endParaRPr lang="fr-FR" dirty="0">
+              <a:solidFill>
+                <a:schemeClr val="bg1"/>
+              </a:solidFill>
+            </a:endParaRPr>
+          </a:p>
+        </p:txBody>
+      </p:sp>
+      <p:sp>
+        <p:nvSpPr>
+          <p:cNvPr id="6" name="Organigramme : Jonction de sommaire 5">
+            <a:extLst>
+              <a:ext uri="{FF2B5EF4-FFF2-40B4-BE49-F238E27FC236}">
+                <a16:creationId xmlns:a16="http://schemas.microsoft.com/office/drawing/2014/main" id="{AFE494B9-0F83-406A-BC3B-4523B6B88508}"/>
+              </a:ext>
+            </a:extLst>
+          </p:cNvPr>
+          <p:cNvSpPr/>
+          <p:nvPr/>
+        </p:nvSpPr>
+        <p:spPr>
+          <a:xfrm>
+            <a:off x="3977197" y="2876365"/>
+            <a:ext cx="360000" cy="360000"/>
+          </a:xfrm>
+          <a:prstGeom prst="flowChartSummingJunction">
+            <a:avLst/>
+          </a:prstGeom>
+        </p:spPr>
+        <p:style>
+          <a:lnRef idx="2">
+            <a:schemeClr val="dk1"/>
+          </a:lnRef>
+          <a:fillRef idx="1">
+            <a:schemeClr val="lt1"/>
+          </a:fillRef>
+          <a:effectRef idx="0">
+            <a:schemeClr val="dk1"/>
+          </a:effectRef>
+          <a:fontRef idx="minor">
+            <a:schemeClr val="dk1"/>
+          </a:fontRef>
+        </p:style>
+        <p:txBody>
+          <a:bodyPr rtlCol="0" anchor="ctr"/>
+          <a:lstStyle/>
+          <a:p>
+            <a:pPr algn="ctr"/>
+            <a:endParaRPr lang="fr-FR"/>
+          </a:p>
+        </p:txBody>
+      </p:sp>
+      <p:sp>
+        <p:nvSpPr>
+          <p:cNvPr id="8" name="Organigramme : Jonction de sommaire 7">
+            <a:extLst>
+              <a:ext uri="{FF2B5EF4-FFF2-40B4-BE49-F238E27FC236}">
+                <a16:creationId xmlns:a16="http://schemas.microsoft.com/office/drawing/2014/main" id="{0C939B57-D19A-44EC-92D7-5B0F20E4EDEB}"/>
+              </a:ext>
+            </a:extLst>
+          </p:cNvPr>
+          <p:cNvSpPr/>
+          <p:nvPr/>
+        </p:nvSpPr>
+        <p:spPr>
+          <a:xfrm>
+            <a:off x="4652896" y="2876365"/>
+            <a:ext cx="360000" cy="360000"/>
+          </a:xfrm>
+          <a:prstGeom prst="flowChartSummingJunction">
+            <a:avLst/>
+          </a:prstGeom>
+        </p:spPr>
+        <p:style>
+          <a:lnRef idx="2">
+            <a:schemeClr val="dk1"/>
+          </a:lnRef>
+          <a:fillRef idx="1">
+            <a:schemeClr val="lt1"/>
+          </a:fillRef>
+          <a:effectRef idx="0">
+            <a:schemeClr val="dk1"/>
+          </a:effectRef>
+          <a:fontRef idx="minor">
+            <a:schemeClr val="dk1"/>
+          </a:fontRef>
+        </p:style>
+        <p:txBody>
+          <a:bodyPr rtlCol="0" anchor="ctr"/>
+          <a:lstStyle/>
+          <a:p>
+            <a:pPr algn="ctr"/>
+            <a:endParaRPr lang="fr-FR"/>
+          </a:p>
+        </p:txBody>
+      </p:sp>
+      <p:sp>
+        <p:nvSpPr>
+          <p:cNvPr id="10" name="Organigramme : Jonction de sommaire 9">
+            <a:extLst>
+              <a:ext uri="{FF2B5EF4-FFF2-40B4-BE49-F238E27FC236}">
+                <a16:creationId xmlns:a16="http://schemas.microsoft.com/office/drawing/2014/main" id="{94DC23CF-A68F-48F2-A372-0B07A70B8EA0}"/>
+              </a:ext>
+            </a:extLst>
+          </p:cNvPr>
+          <p:cNvSpPr/>
+          <p:nvPr/>
+        </p:nvSpPr>
+        <p:spPr>
+          <a:xfrm>
+            <a:off x="5328595" y="2876365"/>
+            <a:ext cx="360000" cy="360000"/>
+          </a:xfrm>
+          <a:prstGeom prst="flowChartSummingJunction">
+            <a:avLst/>
+          </a:prstGeom>
+        </p:spPr>
+        <p:style>
+          <a:lnRef idx="2">
+            <a:schemeClr val="dk1"/>
+          </a:lnRef>
+          <a:fillRef idx="1">
+            <a:schemeClr val="lt1"/>
+          </a:fillRef>
+          <a:effectRef idx="0">
+            <a:schemeClr val="dk1"/>
+          </a:effectRef>
+          <a:fontRef idx="minor">
+            <a:schemeClr val="dk1"/>
+          </a:fontRef>
+        </p:style>
+        <p:txBody>
+          <a:bodyPr rtlCol="0" anchor="ctr"/>
+          <a:lstStyle/>
+          <a:p>
+            <a:pPr algn="ctr"/>
+            <a:endParaRPr lang="fr-FR"/>
+          </a:p>
+        </p:txBody>
+      </p:sp>
+      <p:sp>
+        <p:nvSpPr>
+          <p:cNvPr id="12" name="Organigramme : Jonction de sommaire 11">
+            <a:extLst>
+              <a:ext uri="{FF2B5EF4-FFF2-40B4-BE49-F238E27FC236}">
+                <a16:creationId xmlns:a16="http://schemas.microsoft.com/office/drawing/2014/main" id="{7B275B36-1671-4A0C-BEDC-44CEADFD435F}"/>
+              </a:ext>
+            </a:extLst>
+          </p:cNvPr>
+          <p:cNvSpPr/>
+          <p:nvPr/>
+        </p:nvSpPr>
+        <p:spPr>
+          <a:xfrm>
+            <a:off x="3977197" y="3530414"/>
+            <a:ext cx="360000" cy="360000"/>
+          </a:xfrm>
+          <a:prstGeom prst="flowChartSummingJunction">
+            <a:avLst/>
+          </a:prstGeom>
+        </p:spPr>
+        <p:style>
+          <a:lnRef idx="2">
+            <a:schemeClr val="dk1"/>
+          </a:lnRef>
+          <a:fillRef idx="1">
+            <a:schemeClr val="lt1"/>
+          </a:fillRef>
+          <a:effectRef idx="0">
+            <a:schemeClr val="dk1"/>
+          </a:effectRef>
+          <a:fontRef idx="minor">
+            <a:schemeClr val="dk1"/>
+          </a:fontRef>
+        </p:style>
+        <p:txBody>
+          <a:bodyPr rtlCol="0" anchor="ctr"/>
+          <a:lstStyle/>
+          <a:p>
+            <a:pPr algn="ctr"/>
+            <a:endParaRPr lang="fr-FR"/>
+          </a:p>
+        </p:txBody>
+      </p:sp>
+      <p:sp>
+        <p:nvSpPr>
+          <p:cNvPr id="14" name="Organigramme : Jonction de sommaire 13">
+            <a:extLst>
+              <a:ext uri="{FF2B5EF4-FFF2-40B4-BE49-F238E27FC236}">
+                <a16:creationId xmlns:a16="http://schemas.microsoft.com/office/drawing/2014/main" id="{3F52507E-8FAF-4DFC-A787-98AA6B04D725}"/>
+              </a:ext>
+            </a:extLst>
+          </p:cNvPr>
+          <p:cNvSpPr/>
+          <p:nvPr/>
+        </p:nvSpPr>
+        <p:spPr>
+          <a:xfrm>
+            <a:off x="3977197" y="4184463"/>
+            <a:ext cx="360000" cy="360000"/>
+          </a:xfrm>
+          <a:prstGeom prst="flowChartSummingJunction">
+            <a:avLst/>
+          </a:prstGeom>
+        </p:spPr>
+        <p:style>
+          <a:lnRef idx="2">
+            <a:schemeClr val="dk1"/>
+          </a:lnRef>
+          <a:fillRef idx="1">
+            <a:schemeClr val="lt1"/>
+          </a:fillRef>
+          <a:effectRef idx="0">
+            <a:schemeClr val="dk1"/>
+          </a:effectRef>
+          <a:fontRef idx="minor">
+            <a:schemeClr val="dk1"/>
+          </a:fontRef>
+        </p:style>
+        <p:txBody>
+          <a:bodyPr rtlCol="0" anchor="ctr"/>
+          <a:lstStyle/>
+          <a:p>
+            <a:pPr algn="ctr"/>
+            <a:endParaRPr lang="fr-FR"/>
+          </a:p>
+        </p:txBody>
+      </p:sp>
+      <p:sp>
+        <p:nvSpPr>
+          <p:cNvPr id="16" name="Organigramme : Jonction de sommaire 15">
+            <a:extLst>
+              <a:ext uri="{FF2B5EF4-FFF2-40B4-BE49-F238E27FC236}">
+                <a16:creationId xmlns:a16="http://schemas.microsoft.com/office/drawing/2014/main" id="{CE8B3D14-6071-42AC-8ECF-6879CB20EFC6}"/>
+              </a:ext>
+            </a:extLst>
+          </p:cNvPr>
+          <p:cNvSpPr/>
+          <p:nvPr/>
+        </p:nvSpPr>
+        <p:spPr>
+          <a:xfrm>
+            <a:off x="4652896" y="3530414"/>
+            <a:ext cx="360000" cy="360000"/>
+          </a:xfrm>
+          <a:prstGeom prst="flowChartSummingJunction">
+            <a:avLst/>
+          </a:prstGeom>
+        </p:spPr>
+        <p:style>
+          <a:lnRef idx="2">
+            <a:schemeClr val="dk1"/>
+          </a:lnRef>
+          <a:fillRef idx="1">
+            <a:schemeClr val="lt1"/>
+          </a:fillRef>
+          <a:effectRef idx="0">
+            <a:schemeClr val="dk1"/>
+          </a:effectRef>
+          <a:fontRef idx="minor">
+            <a:schemeClr val="dk1"/>
+          </a:fontRef>
+        </p:style>
+        <p:txBody>
+          <a:bodyPr rtlCol="0" anchor="ctr"/>
+          <a:lstStyle/>
+          <a:p>
+            <a:pPr algn="ctr"/>
+            <a:endParaRPr lang="fr-FR"/>
+          </a:p>
+        </p:txBody>
+      </p:sp>
+      <p:sp>
+        <p:nvSpPr>
+          <p:cNvPr id="18" name="Organigramme : Jonction de sommaire 17">
+            <a:extLst>
+              <a:ext uri="{FF2B5EF4-FFF2-40B4-BE49-F238E27FC236}">
+                <a16:creationId xmlns:a16="http://schemas.microsoft.com/office/drawing/2014/main" id="{AF58157E-0D84-4EFF-89AE-C4BB6C628504}"/>
+              </a:ext>
+            </a:extLst>
+          </p:cNvPr>
+          <p:cNvSpPr/>
+          <p:nvPr/>
+        </p:nvSpPr>
+        <p:spPr>
+          <a:xfrm>
+            <a:off x="4648912" y="4184463"/>
+            <a:ext cx="360000" cy="360000"/>
+          </a:xfrm>
+          <a:prstGeom prst="flowChartSummingJunction">
+            <a:avLst/>
+          </a:prstGeom>
+        </p:spPr>
+        <p:style>
+          <a:lnRef idx="2">
+            <a:schemeClr val="dk1"/>
+          </a:lnRef>
+          <a:fillRef idx="1">
+            <a:schemeClr val="lt1"/>
+          </a:fillRef>
+          <a:effectRef idx="0">
+            <a:schemeClr val="dk1"/>
+          </a:effectRef>
+          <a:fontRef idx="minor">
+            <a:schemeClr val="dk1"/>
+          </a:fontRef>
+        </p:style>
+        <p:txBody>
+          <a:bodyPr rtlCol="0" anchor="ctr"/>
+          <a:lstStyle/>
+          <a:p>
+            <a:pPr algn="ctr"/>
+            <a:endParaRPr lang="fr-FR"/>
+          </a:p>
+        </p:txBody>
+      </p:sp>
+      <p:sp>
+        <p:nvSpPr>
+          <p:cNvPr id="20" name="Organigramme : Jonction de sommaire 19">
+            <a:extLst>
+              <a:ext uri="{FF2B5EF4-FFF2-40B4-BE49-F238E27FC236}">
+                <a16:creationId xmlns:a16="http://schemas.microsoft.com/office/drawing/2014/main" id="{C3C4D023-5630-4D9D-8965-B7034EBCA84B}"/>
+              </a:ext>
+            </a:extLst>
+          </p:cNvPr>
+          <p:cNvSpPr/>
+          <p:nvPr/>
+        </p:nvSpPr>
+        <p:spPr>
+          <a:xfrm>
+            <a:off x="5328595" y="3530414"/>
+            <a:ext cx="360000" cy="360000"/>
+          </a:xfrm>
+          <a:prstGeom prst="flowChartSummingJunction">
+            <a:avLst/>
+          </a:prstGeom>
+        </p:spPr>
+        <p:style>
+          <a:lnRef idx="2">
+            <a:schemeClr val="dk1"/>
+          </a:lnRef>
+          <a:fillRef idx="1">
+            <a:schemeClr val="lt1"/>
+          </a:fillRef>
+          <a:effectRef idx="0">
+            <a:schemeClr val="dk1"/>
+          </a:effectRef>
+          <a:fontRef idx="minor">
+            <a:schemeClr val="dk1"/>
+          </a:fontRef>
+        </p:style>
+        <p:txBody>
+          <a:bodyPr rtlCol="0" anchor="ctr"/>
+          <a:lstStyle/>
+          <a:p>
+            <a:pPr algn="ctr"/>
+            <a:endParaRPr lang="fr-FR"/>
+          </a:p>
+        </p:txBody>
+      </p:sp>
+      <p:sp>
+        <p:nvSpPr>
+          <p:cNvPr id="22" name="Organigramme : Jonction de sommaire 21">
+            <a:extLst>
+              <a:ext uri="{FF2B5EF4-FFF2-40B4-BE49-F238E27FC236}">
+                <a16:creationId xmlns:a16="http://schemas.microsoft.com/office/drawing/2014/main" id="{01E928C7-3983-4E6A-B285-655271CC053E}"/>
+              </a:ext>
+            </a:extLst>
+          </p:cNvPr>
+          <p:cNvSpPr/>
+          <p:nvPr/>
+        </p:nvSpPr>
+        <p:spPr>
+          <a:xfrm>
+            <a:off x="5328595" y="4184463"/>
+            <a:ext cx="360000" cy="360000"/>
+          </a:xfrm>
+          <a:prstGeom prst="flowChartSummingJunction">
+            <a:avLst/>
+          </a:prstGeom>
+        </p:spPr>
+        <p:style>
+          <a:lnRef idx="2">
+            <a:schemeClr val="dk1"/>
+          </a:lnRef>
+          <a:fillRef idx="1">
+            <a:schemeClr val="lt1"/>
+          </a:fillRef>
+          <a:effectRef idx="0">
+            <a:schemeClr val="dk1"/>
+          </a:effectRef>
+          <a:fontRef idx="minor">
+            <a:schemeClr val="dk1"/>
+          </a:fontRef>
+        </p:style>
+        <p:txBody>
+          <a:bodyPr rtlCol="0" anchor="ctr"/>
+          <a:lstStyle/>
+          <a:p>
+            <a:pPr algn="ctr"/>
+            <a:endParaRPr lang="fr-FR"/>
+          </a:p>
+        </p:txBody>
+      </p:sp>
+      <p:sp>
+        <p:nvSpPr>
+          <p:cNvPr id="23" name="Flèche : droite 22">
+            <a:extLst>
+              <a:ext uri="{FF2B5EF4-FFF2-40B4-BE49-F238E27FC236}">
+                <a16:creationId xmlns:a16="http://schemas.microsoft.com/office/drawing/2014/main" id="{9671EC53-3F6C-486D-A551-586F6FDAAFA7}"/>
+              </a:ext>
+            </a:extLst>
+          </p:cNvPr>
+          <p:cNvSpPr/>
+          <p:nvPr/>
+        </p:nvSpPr>
+        <p:spPr>
+          <a:xfrm>
+            <a:off x="2682754" y="2831433"/>
+            <a:ext cx="923277" cy="449863"/>
+          </a:xfrm>
+          <a:prstGeom prst="rightArrow">
+            <a:avLst/>
+          </a:prstGeom>
+        </p:spPr>
+        <p:style>
+          <a:lnRef idx="2">
+            <a:schemeClr val="accent6">
+              <a:shade val="50000"/>
+            </a:schemeClr>
+          </a:lnRef>
+          <a:fillRef idx="1">
+            <a:schemeClr val="accent6"/>
+          </a:fillRef>
+          <a:effectRef idx="0">
+            <a:schemeClr val="accent6"/>
+          </a:effectRef>
+          <a:fontRef idx="minor">
+            <a:schemeClr val="lt1"/>
+          </a:fontRef>
+        </p:style>
+        <p:txBody>
+          <a:bodyPr rtlCol="0" anchor="ctr"/>
+          <a:lstStyle/>
+          <a:p>
+            <a:pPr algn="ctr"/>
+            <a:endParaRPr lang="fr-FR"/>
+          </a:p>
+        </p:txBody>
+      </p:sp>
+      <p:sp>
+        <p:nvSpPr>
+          <p:cNvPr id="25" name="Flèche : droite 24">
+            <a:extLst>
+              <a:ext uri="{FF2B5EF4-FFF2-40B4-BE49-F238E27FC236}">
+                <a16:creationId xmlns:a16="http://schemas.microsoft.com/office/drawing/2014/main" id="{DC8F0604-954B-4E59-BD20-12D95D58E554}"/>
+              </a:ext>
+            </a:extLst>
+          </p:cNvPr>
+          <p:cNvSpPr/>
+          <p:nvPr/>
+        </p:nvSpPr>
+        <p:spPr>
+          <a:xfrm>
+            <a:off x="2704493" y="4139531"/>
+            <a:ext cx="923277" cy="449863"/>
+          </a:xfrm>
+          <a:prstGeom prst="rightArrow">
+            <a:avLst/>
+          </a:prstGeom>
+        </p:spPr>
+        <p:style>
+          <a:lnRef idx="2">
+            <a:schemeClr val="accent6">
+              <a:shade val="50000"/>
+            </a:schemeClr>
+          </a:lnRef>
+          <a:fillRef idx="1">
+            <a:schemeClr val="accent6"/>
+          </a:fillRef>
+          <a:effectRef idx="0">
+            <a:schemeClr val="accent6"/>
+          </a:effectRef>
+          <a:fontRef idx="minor">
+            <a:schemeClr val="lt1"/>
+          </a:fontRef>
+        </p:style>
+        <p:txBody>
+          <a:bodyPr rtlCol="0" anchor="ctr"/>
+          <a:lstStyle/>
+          <a:p>
+            <a:pPr algn="ctr"/>
+            <a:endParaRPr lang="fr-FR"/>
+          </a:p>
+        </p:txBody>
+      </p:sp>
+      <p:sp>
+        <p:nvSpPr>
+          <p:cNvPr id="26" name="Cube 25">
+            <a:extLst>
+              <a:ext uri="{FF2B5EF4-FFF2-40B4-BE49-F238E27FC236}">
+                <a16:creationId xmlns:a16="http://schemas.microsoft.com/office/drawing/2014/main" id="{767DAEB6-6750-4850-BFA6-EC7F84AF8003}"/>
+              </a:ext>
+            </a:extLst>
+          </p:cNvPr>
+          <p:cNvSpPr/>
+          <p:nvPr/>
+        </p:nvSpPr>
+        <p:spPr>
+          <a:xfrm>
+            <a:off x="204186" y="2831433"/>
+            <a:ext cx="2240568" cy="449863"/>
+          </a:xfrm>
+          <a:prstGeom prst="cube">
+            <a:avLst/>
+          </a:prstGeom>
+        </p:spPr>
+        <p:style>
+          <a:lnRef idx="2">
+            <a:schemeClr val="accent6">
+              <a:shade val="50000"/>
+            </a:schemeClr>
+          </a:lnRef>
+          <a:fillRef idx="1">
+            <a:schemeClr val="accent6"/>
+          </a:fillRef>
+          <a:effectRef idx="0">
+            <a:schemeClr val="accent6"/>
+          </a:effectRef>
+          <a:fontRef idx="minor">
+            <a:schemeClr val="lt1"/>
+          </a:fontRef>
+        </p:style>
+        <p:txBody>
+          <a:bodyPr rtlCol="0" anchor="ctr"/>
+          <a:lstStyle/>
+          <a:p>
+            <a:pPr algn="ctr"/>
+            <a:r>
+              <a:rPr lang="fr-BE" dirty="0" err="1"/>
+              <a:t>Intermediate</a:t>
+            </a:r>
+            <a:r>
+              <a:rPr lang="fr-BE" dirty="0"/>
+              <a:t> pixels</a:t>
+            </a:r>
+            <a:endParaRPr lang="fr-FR" dirty="0"/>
+          </a:p>
+        </p:txBody>
+      </p:sp>
+      <p:cxnSp>
+        <p:nvCxnSpPr>
+          <p:cNvPr id="28" name="Connecteur droit avec flèche 27">
+            <a:extLst>
+              <a:ext uri="{FF2B5EF4-FFF2-40B4-BE49-F238E27FC236}">
+                <a16:creationId xmlns:a16="http://schemas.microsoft.com/office/drawing/2014/main" id="{414354A3-45B4-4ECE-85E2-DB796100DC2A}"/>
+              </a:ext>
+            </a:extLst>
+          </p:cNvPr>
+          <p:cNvCxnSpPr>
+            <a:cxnSpLocks/>
+          </p:cNvCxnSpPr>
+          <p:nvPr/>
+        </p:nvCxnSpPr>
+        <p:spPr>
+          <a:xfrm>
+            <a:off x="208443" y="3781438"/>
+            <a:ext cx="2128102" cy="0"/>
+          </a:xfrm>
+          <a:prstGeom prst="straightConnector1">
+            <a:avLst/>
+          </a:prstGeom>
+          <a:ln w="57150">
+            <a:solidFill>
+              <a:schemeClr val="tx1"/>
+            </a:solidFill>
+            <a:headEnd type="triangle"/>
+            <a:tailEnd type="triangle"/>
+          </a:ln>
+        </p:spPr>
+        <p:style>
+          <a:lnRef idx="1">
+            <a:schemeClr val="accent1"/>
+          </a:lnRef>
+          <a:fillRef idx="0">
+            <a:schemeClr val="accent1"/>
+          </a:fillRef>
+          <a:effectRef idx="0">
+            <a:schemeClr val="accent1"/>
+          </a:effectRef>
+          <a:fontRef idx="minor">
+            <a:schemeClr val="tx1"/>
+          </a:fontRef>
+        </p:style>
+      </p:cxnSp>
+      <p:sp>
+        <p:nvSpPr>
+          <p:cNvPr id="30" name="Cube 29">
+            <a:extLst>
+              <a:ext uri="{FF2B5EF4-FFF2-40B4-BE49-F238E27FC236}">
+                <a16:creationId xmlns:a16="http://schemas.microsoft.com/office/drawing/2014/main" id="{20EF8DD2-E460-4FC2-BA75-8E322C28CA3E}"/>
+              </a:ext>
+            </a:extLst>
+          </p:cNvPr>
+          <p:cNvSpPr/>
+          <p:nvPr/>
+        </p:nvSpPr>
+        <p:spPr>
+          <a:xfrm>
+            <a:off x="152210" y="4139530"/>
+            <a:ext cx="2240568" cy="449863"/>
+          </a:xfrm>
+          <a:prstGeom prst="cube">
+            <a:avLst/>
+          </a:prstGeom>
+        </p:spPr>
+        <p:style>
+          <a:lnRef idx="2">
+            <a:schemeClr val="accent6">
+              <a:shade val="50000"/>
+            </a:schemeClr>
+          </a:lnRef>
+          <a:fillRef idx="1">
+            <a:schemeClr val="accent6"/>
+          </a:fillRef>
+          <a:effectRef idx="0">
+            <a:schemeClr val="accent6"/>
+          </a:effectRef>
+          <a:fontRef idx="minor">
+            <a:schemeClr val="lt1"/>
+          </a:fontRef>
+        </p:style>
+        <p:txBody>
+          <a:bodyPr rtlCol="0" anchor="ctr"/>
+          <a:lstStyle/>
+          <a:p>
+            <a:pPr algn="ctr"/>
+            <a:r>
+              <a:rPr lang="fr-BE" dirty="0" err="1"/>
+              <a:t>Depthwise</a:t>
+            </a:r>
+            <a:r>
+              <a:rPr lang="fr-BE" dirty="0"/>
+              <a:t> </a:t>
+            </a:r>
+            <a:r>
+              <a:rPr lang="fr-BE" dirty="0" err="1"/>
+              <a:t>weights</a:t>
+            </a:r>
+            <a:endParaRPr lang="fr-FR" dirty="0"/>
+          </a:p>
+        </p:txBody>
+      </p:sp>
+      <mc:AlternateContent xmlns:mc="http://schemas.openxmlformats.org/markup-compatibility/2006">
+        <mc:Choice xmlns:a14="http://schemas.microsoft.com/office/drawing/2010/main" Requires="a14">
+          <p:sp>
+            <p:nvSpPr>
+              <p:cNvPr id="31" name="ZoneTexte 30">
+                <a:extLst>
+                  <a:ext uri="{FF2B5EF4-FFF2-40B4-BE49-F238E27FC236}">
+                    <a16:creationId xmlns:a16="http://schemas.microsoft.com/office/drawing/2014/main" id="{C2293E1A-88FD-4C34-AE20-1CC21CACD3C2}"/>
+                  </a:ext>
+                </a:extLst>
+              </p:cNvPr>
+              <p:cNvSpPr txBox="1"/>
+              <p:nvPr/>
+            </p:nvSpPr>
+            <p:spPr>
+              <a:xfrm>
+                <a:off x="358900" y="3342346"/>
+                <a:ext cx="1931139" cy="391261"/>
+              </a:xfrm>
+              <a:prstGeom prst="rect">
+                <a:avLst/>
+              </a:prstGeom>
+              <a:noFill/>
+            </p:spPr>
+            <p:txBody>
+              <a:bodyPr wrap="square" rtlCol="0">
+                <a:spAutoFit/>
+              </a:bodyPr>
+              <a:lstStyle/>
+              <a:p>
+                <a14:m>
+                  <m:oMathPara xmlns:m="http://schemas.openxmlformats.org/officeDocument/2006/math">
+                    <m:oMathParaPr>
+                      <m:jc m:val="centerGroup"/>
+                    </m:oMathParaPr>
+                    <m:oMath xmlns:m="http://schemas.openxmlformats.org/officeDocument/2006/math">
+                      <m:sSub>
+                        <m:sSubPr>
+                          <m:ctrlPr>
+                            <a:rPr lang="fr-BE" b="0" i="1" smtClean="0">
+                              <a:latin typeface="Cambria Math" panose="02040503050406030204" pitchFamily="18" charset="0"/>
+                            </a:rPr>
+                          </m:ctrlPr>
+                        </m:sSubPr>
+                        <m:e>
+                          <m:r>
+                            <a:rPr lang="fr-BE" b="0" i="1" smtClean="0">
+                              <a:latin typeface="Cambria Math" panose="02040503050406030204" pitchFamily="18" charset="0"/>
+                            </a:rPr>
+                            <m:t>𝑁</m:t>
+                          </m:r>
+                        </m:e>
+                        <m:sub>
+                          <m:r>
+                            <a:rPr lang="fr-BE" b="0" i="1" smtClean="0">
+                              <a:latin typeface="Cambria Math" panose="02040503050406030204" pitchFamily="18" charset="0"/>
+                            </a:rPr>
+                            <m:t>𝑝𝑎𝑟</m:t>
+                          </m:r>
+                        </m:sub>
+                      </m:sSub>
+                      <m:r>
+                        <a:rPr lang="fr-BE" b="0" i="1" smtClean="0">
+                          <a:latin typeface="Cambria Math" panose="02040503050406030204" pitchFamily="18" charset="0"/>
+                        </a:rPr>
+                        <m:t>×</m:t>
+                      </m:r>
+                      <m:sSub>
+                        <m:sSubPr>
+                          <m:ctrlPr>
+                            <a:rPr lang="fr-BE" b="0" i="1" smtClean="0">
+                              <a:latin typeface="Cambria Math" panose="02040503050406030204" pitchFamily="18" charset="0"/>
+                            </a:rPr>
+                          </m:ctrlPr>
+                        </m:sSubPr>
+                        <m:e>
+                          <m:r>
+                            <a:rPr lang="fr-BE" b="0" i="1" smtClean="0">
+                              <a:latin typeface="Cambria Math" panose="02040503050406030204" pitchFamily="18" charset="0"/>
+                            </a:rPr>
+                            <m:t>𝑁</m:t>
+                          </m:r>
+                        </m:e>
+                        <m:sub>
+                          <m:r>
+                            <a:rPr lang="fr-BE" b="0" i="1" smtClean="0">
+                              <a:latin typeface="Cambria Math" panose="02040503050406030204" pitchFamily="18" charset="0"/>
+                            </a:rPr>
+                            <m:t>𝑘𝑥</m:t>
+                          </m:r>
+                        </m:sub>
+                      </m:sSub>
+                      <m:r>
+                        <a:rPr lang="fr-BE" b="0" i="1" smtClean="0">
+                          <a:latin typeface="Cambria Math" panose="02040503050406030204" pitchFamily="18" charset="0"/>
+                        </a:rPr>
+                        <m:t>×</m:t>
+                      </m:r>
+                      <m:sSub>
+                        <m:sSubPr>
+                          <m:ctrlPr>
+                            <a:rPr lang="fr-BE" b="0" i="1" smtClean="0">
+                              <a:latin typeface="Cambria Math" panose="02040503050406030204" pitchFamily="18" charset="0"/>
+                            </a:rPr>
+                          </m:ctrlPr>
+                        </m:sSubPr>
+                        <m:e>
+                          <m:r>
+                            <a:rPr lang="fr-BE" b="0" i="1" smtClean="0">
+                              <a:latin typeface="Cambria Math" panose="02040503050406030204" pitchFamily="18" charset="0"/>
+                            </a:rPr>
+                            <m:t>𝑁</m:t>
+                          </m:r>
+                        </m:e>
+                        <m:sub>
+                          <m:r>
+                            <a:rPr lang="fr-BE" b="0" i="1" smtClean="0">
+                              <a:latin typeface="Cambria Math" panose="02040503050406030204" pitchFamily="18" charset="0"/>
+                            </a:rPr>
+                            <m:t>𝑘𝑦</m:t>
+                          </m:r>
+                        </m:sub>
+                      </m:sSub>
+                    </m:oMath>
+                  </m:oMathPara>
+                </a14:m>
+                <a:endParaRPr lang="fr-FR" dirty="0"/>
+              </a:p>
+            </p:txBody>
+          </p:sp>
+        </mc:Choice>
+        <mc:Fallback>
+          <p:sp>
+            <p:nvSpPr>
+              <p:cNvPr id="31" name="ZoneTexte 30">
+                <a:extLst>
+                  <a:ext uri="{FF2B5EF4-FFF2-40B4-BE49-F238E27FC236}">
+                    <a16:creationId xmlns:a16="http://schemas.microsoft.com/office/drawing/2014/main" id="{C2293E1A-88FD-4C34-AE20-1CC21CACD3C2}"/>
+                  </a:ext>
+                </a:extLst>
+              </p:cNvPr>
+              <p:cNvSpPr txBox="1">
+                <a:spLocks noRot="1" noChangeAspect="1" noMove="1" noResize="1" noEditPoints="1" noAdjustHandles="1" noChangeArrowheads="1" noChangeShapeType="1" noTextEdit="1"/>
+              </p:cNvSpPr>
+              <p:nvPr/>
+            </p:nvSpPr>
+            <p:spPr>
+              <a:xfrm>
+                <a:off x="358900" y="3342346"/>
+                <a:ext cx="1931139" cy="391261"/>
+              </a:xfrm>
+              <a:prstGeom prst="rect">
+                <a:avLst/>
+              </a:prstGeom>
+              <a:blipFill>
+                <a:blip r:embed="rId2"/>
+                <a:stretch>
+                  <a:fillRect b="-7813"/>
+                </a:stretch>
+              </a:blipFill>
+            </p:spPr>
+            <p:txBody>
+              <a:bodyPr/>
+              <a:lstStyle/>
+              <a:p>
+                <a:r>
+                  <a:rPr lang="fr-FR">
+                    <a:noFill/>
+                  </a:rPr>
+                  <a:t> </a:t>
+                </a:r>
+              </a:p>
+            </p:txBody>
+          </p:sp>
+        </mc:Fallback>
+      </mc:AlternateContent>
+      <p:sp>
+        <p:nvSpPr>
+          <p:cNvPr id="32" name="Rectangle 31">
+            <a:extLst>
+              <a:ext uri="{FF2B5EF4-FFF2-40B4-BE49-F238E27FC236}">
+                <a16:creationId xmlns:a16="http://schemas.microsoft.com/office/drawing/2014/main" id="{2F9C59DE-A1A4-4C8C-8333-E96897C96E10}"/>
+              </a:ext>
+            </a:extLst>
+          </p:cNvPr>
+          <p:cNvSpPr/>
+          <p:nvPr/>
+        </p:nvSpPr>
+        <p:spPr>
+          <a:xfrm>
+            <a:off x="7639844" y="2095129"/>
+            <a:ext cx="772357" cy="2627999"/>
+          </a:xfrm>
+          <a:prstGeom prst="rect">
+            <a:avLst/>
+          </a:prstGeom>
+        </p:spPr>
+        <p:style>
+          <a:lnRef idx="2">
+            <a:schemeClr val="accent2">
+              <a:shade val="50000"/>
+            </a:schemeClr>
+          </a:lnRef>
+          <a:fillRef idx="1">
+            <a:schemeClr val="accent2"/>
+          </a:fillRef>
+          <a:effectRef idx="0">
+            <a:schemeClr val="accent2"/>
+          </a:effectRef>
+          <a:fontRef idx="minor">
+            <a:schemeClr val="lt1"/>
+          </a:fontRef>
+        </p:style>
+        <p:txBody>
+          <a:bodyPr vert="vert270" rtlCol="0" anchor="ctr"/>
+          <a:lstStyle/>
+          <a:p>
+            <a:pPr algn="ctr"/>
+            <a:r>
+              <a:rPr lang="fr-BE" dirty="0" err="1"/>
+              <a:t>Adder</a:t>
+            </a:r>
+            <a:r>
+              <a:rPr lang="fr-BE" dirty="0"/>
+              <a:t> </a:t>
+            </a:r>
+            <a:r>
+              <a:rPr lang="fr-BE" dirty="0" err="1"/>
+              <a:t>tree</a:t>
+            </a:r>
+            <a:endParaRPr lang="fr-FR" dirty="0"/>
+          </a:p>
+        </p:txBody>
+      </p:sp>
+      <p:sp>
+        <p:nvSpPr>
+          <p:cNvPr id="34" name="Flèche : droite 33">
+            <a:extLst>
+              <a:ext uri="{FF2B5EF4-FFF2-40B4-BE49-F238E27FC236}">
+                <a16:creationId xmlns:a16="http://schemas.microsoft.com/office/drawing/2014/main" id="{3A3C8B5D-DD95-4956-9D3A-D0FE682E7753}"/>
+              </a:ext>
+            </a:extLst>
+          </p:cNvPr>
+          <p:cNvSpPr/>
+          <p:nvPr/>
+        </p:nvSpPr>
+        <p:spPr>
+          <a:xfrm>
+            <a:off x="6594299" y="3342346"/>
+            <a:ext cx="923277" cy="449863"/>
+          </a:xfrm>
+          <a:prstGeom prst="rightArrow">
+            <a:avLst/>
+          </a:prstGeom>
+        </p:spPr>
+        <p:style>
+          <a:lnRef idx="2">
+            <a:schemeClr val="accent1">
+              <a:shade val="50000"/>
+            </a:schemeClr>
+          </a:lnRef>
+          <a:fillRef idx="1">
+            <a:schemeClr val="accent1"/>
+          </a:fillRef>
+          <a:effectRef idx="0">
+            <a:schemeClr val="accent1"/>
+          </a:effectRef>
+          <a:fontRef idx="minor">
+            <a:schemeClr val="lt1"/>
+          </a:fontRef>
+        </p:style>
+        <p:txBody>
+          <a:bodyPr rtlCol="0" anchor="ctr"/>
+          <a:lstStyle/>
+          <a:p>
+            <a:pPr algn="ctr"/>
+            <a:endParaRPr lang="fr-FR"/>
+          </a:p>
+        </p:txBody>
+      </p:sp>
+      <p:sp>
+        <p:nvSpPr>
+          <p:cNvPr id="36" name="Flèche : droite 35">
+            <a:extLst>
+              <a:ext uri="{FF2B5EF4-FFF2-40B4-BE49-F238E27FC236}">
+                <a16:creationId xmlns:a16="http://schemas.microsoft.com/office/drawing/2014/main" id="{75A6498D-127E-4F4C-A157-4396F13A61E6}"/>
+              </a:ext>
+            </a:extLst>
+          </p:cNvPr>
+          <p:cNvSpPr/>
+          <p:nvPr/>
+        </p:nvSpPr>
+        <p:spPr>
+          <a:xfrm>
+            <a:off x="8534469" y="3342346"/>
+            <a:ext cx="923277" cy="449863"/>
+          </a:xfrm>
+          <a:prstGeom prst="rightArrow">
+            <a:avLst/>
+          </a:prstGeom>
+        </p:spPr>
+        <p:style>
+          <a:lnRef idx="2">
+            <a:schemeClr val="accent2">
+              <a:shade val="50000"/>
+            </a:schemeClr>
+          </a:lnRef>
+          <a:fillRef idx="1">
+            <a:schemeClr val="accent2"/>
+          </a:fillRef>
+          <a:effectRef idx="0">
+            <a:schemeClr val="accent2"/>
+          </a:effectRef>
+          <a:fontRef idx="minor">
+            <a:schemeClr val="lt1"/>
+          </a:fontRef>
+        </p:style>
+        <p:txBody>
+          <a:bodyPr rtlCol="0" anchor="ctr"/>
+          <a:lstStyle/>
+          <a:p>
+            <a:pPr algn="ctr"/>
+            <a:endParaRPr lang="fr-FR"/>
+          </a:p>
+        </p:txBody>
+      </p:sp>
+      <p:sp>
+        <p:nvSpPr>
+          <p:cNvPr id="38" name="Rectangle 37">
+            <a:extLst>
+              <a:ext uri="{FF2B5EF4-FFF2-40B4-BE49-F238E27FC236}">
+                <a16:creationId xmlns:a16="http://schemas.microsoft.com/office/drawing/2014/main" id="{2A580858-E00D-48D9-9D44-6CFB50D1080D}"/>
+              </a:ext>
+            </a:extLst>
+          </p:cNvPr>
+          <p:cNvSpPr/>
+          <p:nvPr/>
+        </p:nvSpPr>
+        <p:spPr>
+          <a:xfrm>
+            <a:off x="9580014" y="2088471"/>
+            <a:ext cx="772357" cy="2627999"/>
+          </a:xfrm>
+          <a:prstGeom prst="rect">
+            <a:avLst/>
+          </a:prstGeom>
+        </p:spPr>
+        <p:style>
+          <a:lnRef idx="2">
+            <a:schemeClr val="accent3">
+              <a:shade val="50000"/>
+            </a:schemeClr>
+          </a:lnRef>
+          <a:fillRef idx="1">
+            <a:schemeClr val="accent3"/>
+          </a:fillRef>
+          <a:effectRef idx="0">
+            <a:schemeClr val="accent3"/>
+          </a:effectRef>
+          <a:fontRef idx="minor">
+            <a:schemeClr val="lt1"/>
+          </a:fontRef>
+        </p:style>
+        <p:txBody>
+          <a:bodyPr vert="vert270" rtlCol="0" anchor="ctr"/>
+          <a:lstStyle/>
+          <a:p>
+            <a:pPr algn="ctr"/>
+            <a:r>
+              <a:rPr lang="fr-BE" dirty="0" err="1"/>
+              <a:t>ReLU</a:t>
+            </a:r>
+            <a:r>
+              <a:rPr lang="fr-BE" dirty="0"/>
+              <a:t> 6</a:t>
+            </a:r>
+            <a:endParaRPr lang="fr-FR" dirty="0"/>
+          </a:p>
+        </p:txBody>
+      </p:sp>
+    </p:spTree>
+    <p:extLst>
+      <p:ext uri="{BB962C8B-B14F-4D97-AF65-F5344CB8AC3E}">
+        <p14:creationId xmlns:p14="http://schemas.microsoft.com/office/powerpoint/2010/main" val="2340611401"/>
       </p:ext>
     </p:extLst>
   </p:cSld>

</xml_diff>